<commit_message>
corrections mineures : refait schema bao et rsd (chap1), change le titre du chap6,...
</commit_message>
<xml_diff>
--- a/plots/schema_bao.pptx
+++ b/plots/schema_bao.pptx
@@ -104,6 +104,11 @@
       </a:defRPr>
     </a:lvl9pPr>
   </p:defaultTextStyle>
+  <p:extLst>
+    <p:ext uri="{EFAFB233-063F-42B5-8137-9DF3F51BA10A}">
+      <p15:sldGuideLst xmlns:p15="http://schemas.microsoft.com/office/powerpoint/2012/main"/>
+    </p:ext>
+  </p:extLst>
 </p:presentation>
 </file>
 
@@ -256,7 +261,7 @@
           <a:p>
             <a:fld id="{B42DCF1D-213C-7546-95B3-0E6369FCEBF4}" type="datetimeFigureOut">
               <a:rPr lang="en-GB" smtClean="0"/>
-              <a:t>22/03/2020</a:t>
+              <a:t>16/11/2020</a:t>
             </a:fld>
             <a:endParaRPr lang="en-GB"/>
           </a:p>
@@ -456,7 +461,7 @@
           <a:p>
             <a:fld id="{B42DCF1D-213C-7546-95B3-0E6369FCEBF4}" type="datetimeFigureOut">
               <a:rPr lang="en-GB" smtClean="0"/>
-              <a:t>22/03/2020</a:t>
+              <a:t>16/11/2020</a:t>
             </a:fld>
             <a:endParaRPr lang="en-GB"/>
           </a:p>
@@ -666,7 +671,7 @@
           <a:p>
             <a:fld id="{B42DCF1D-213C-7546-95B3-0E6369FCEBF4}" type="datetimeFigureOut">
               <a:rPr lang="en-GB" smtClean="0"/>
-              <a:t>22/03/2020</a:t>
+              <a:t>16/11/2020</a:t>
             </a:fld>
             <a:endParaRPr lang="en-GB"/>
           </a:p>
@@ -866,7 +871,7 @@
           <a:p>
             <a:fld id="{B42DCF1D-213C-7546-95B3-0E6369FCEBF4}" type="datetimeFigureOut">
               <a:rPr lang="en-GB" smtClean="0"/>
-              <a:t>22/03/2020</a:t>
+              <a:t>16/11/2020</a:t>
             </a:fld>
             <a:endParaRPr lang="en-GB"/>
           </a:p>
@@ -1142,7 +1147,7 @@
           <a:p>
             <a:fld id="{B42DCF1D-213C-7546-95B3-0E6369FCEBF4}" type="datetimeFigureOut">
               <a:rPr lang="en-GB" smtClean="0"/>
-              <a:t>22/03/2020</a:t>
+              <a:t>16/11/2020</a:t>
             </a:fld>
             <a:endParaRPr lang="en-GB"/>
           </a:p>
@@ -1410,7 +1415,7 @@
           <a:p>
             <a:fld id="{B42DCF1D-213C-7546-95B3-0E6369FCEBF4}" type="datetimeFigureOut">
               <a:rPr lang="en-GB" smtClean="0"/>
-              <a:t>22/03/2020</a:t>
+              <a:t>16/11/2020</a:t>
             </a:fld>
             <a:endParaRPr lang="en-GB"/>
           </a:p>
@@ -1825,7 +1830,7 @@
           <a:p>
             <a:fld id="{B42DCF1D-213C-7546-95B3-0E6369FCEBF4}" type="datetimeFigureOut">
               <a:rPr lang="en-GB" smtClean="0"/>
-              <a:t>22/03/2020</a:t>
+              <a:t>16/11/2020</a:t>
             </a:fld>
             <a:endParaRPr lang="en-GB"/>
           </a:p>
@@ -1967,7 +1972,7 @@
           <a:p>
             <a:fld id="{B42DCF1D-213C-7546-95B3-0E6369FCEBF4}" type="datetimeFigureOut">
               <a:rPr lang="en-GB" smtClean="0"/>
-              <a:t>22/03/2020</a:t>
+              <a:t>16/11/2020</a:t>
             </a:fld>
             <a:endParaRPr lang="en-GB"/>
           </a:p>
@@ -2080,7 +2085,7 @@
           <a:p>
             <a:fld id="{B42DCF1D-213C-7546-95B3-0E6369FCEBF4}" type="datetimeFigureOut">
               <a:rPr lang="en-GB" smtClean="0"/>
-              <a:t>22/03/2020</a:t>
+              <a:t>16/11/2020</a:t>
             </a:fld>
             <a:endParaRPr lang="en-GB"/>
           </a:p>
@@ -2393,7 +2398,7 @@
           <a:p>
             <a:fld id="{B42DCF1D-213C-7546-95B3-0E6369FCEBF4}" type="datetimeFigureOut">
               <a:rPr lang="en-GB" smtClean="0"/>
-              <a:t>22/03/2020</a:t>
+              <a:t>16/11/2020</a:t>
             </a:fld>
             <a:endParaRPr lang="en-GB"/>
           </a:p>
@@ -2682,7 +2687,7 @@
           <a:p>
             <a:fld id="{B42DCF1D-213C-7546-95B3-0E6369FCEBF4}" type="datetimeFigureOut">
               <a:rPr lang="en-GB" smtClean="0"/>
-              <a:t>22/03/2020</a:t>
+              <a:t>16/11/2020</a:t>
             </a:fld>
             <a:endParaRPr lang="en-GB"/>
           </a:p>
@@ -2925,7 +2930,7 @@
           <a:p>
             <a:fld id="{B42DCF1D-213C-7546-95B3-0E6369FCEBF4}" type="datetimeFigureOut">
               <a:rPr lang="en-GB" smtClean="0"/>
-              <a:t>22/03/2020</a:t>
+              <a:t>16/11/2020</a:t>
             </a:fld>
             <a:endParaRPr lang="en-GB"/>
           </a:p>
@@ -3536,94 +3541,6 @@
           </a:fontRef>
         </p:style>
       </p:cxnSp>
-      <p:cxnSp>
-        <p:nvCxnSpPr>
-          <p:cNvPr id="25" name="Straight Connector 24">
-            <a:extLst>
-              <a:ext uri="{FF2B5EF4-FFF2-40B4-BE49-F238E27FC236}">
-                <a16:creationId xmlns:a16="http://schemas.microsoft.com/office/drawing/2014/main" id="{43249625-2B0C-744C-A56A-0EE06FD4C7C3}"/>
-              </a:ext>
-            </a:extLst>
-          </p:cNvPr>
-          <p:cNvCxnSpPr>
-            <a:cxnSpLocks/>
-          </p:cNvCxnSpPr>
-          <p:nvPr/>
-        </p:nvCxnSpPr>
-        <p:spPr>
-          <a:xfrm>
-            <a:off x="1869109" y="3334573"/>
-            <a:ext cx="0" cy="179407"/>
-          </a:xfrm>
-          <a:prstGeom prst="line">
-            <a:avLst/>
-          </a:prstGeom>
-          <a:ln w="12700">
-            <a:solidFill>
-              <a:schemeClr val="accent1"/>
-            </a:solidFill>
-            <a:prstDash val="solid"/>
-          </a:ln>
-        </p:spPr>
-        <p:style>
-          <a:lnRef idx="1">
-            <a:schemeClr val="accent1"/>
-          </a:lnRef>
-          <a:fillRef idx="0">
-            <a:schemeClr val="accent1"/>
-          </a:fillRef>
-          <a:effectRef idx="0">
-            <a:schemeClr val="accent1"/>
-          </a:effectRef>
-          <a:fontRef idx="minor">
-            <a:schemeClr val="tx1"/>
-          </a:fontRef>
-        </p:style>
-      </p:cxnSp>
-      <p:cxnSp>
-        <p:nvCxnSpPr>
-          <p:cNvPr id="27" name="Straight Connector 26">
-            <a:extLst>
-              <a:ext uri="{FF2B5EF4-FFF2-40B4-BE49-F238E27FC236}">
-                <a16:creationId xmlns:a16="http://schemas.microsoft.com/office/drawing/2014/main" id="{10DF4087-931F-6B44-875F-893C3F65DB0F}"/>
-              </a:ext>
-            </a:extLst>
-          </p:cNvPr>
-          <p:cNvCxnSpPr>
-            <a:cxnSpLocks/>
-          </p:cNvCxnSpPr>
-          <p:nvPr/>
-        </p:nvCxnSpPr>
-        <p:spPr>
-          <a:xfrm>
-            <a:off x="1782971" y="3429000"/>
-            <a:ext cx="176381" cy="0"/>
-          </a:xfrm>
-          <a:prstGeom prst="line">
-            <a:avLst/>
-          </a:prstGeom>
-          <a:ln w="12700">
-            <a:solidFill>
-              <a:schemeClr val="accent1"/>
-            </a:solidFill>
-            <a:prstDash val="solid"/>
-          </a:ln>
-        </p:spPr>
-        <p:style>
-          <a:lnRef idx="1">
-            <a:schemeClr val="accent1"/>
-          </a:lnRef>
-          <a:fillRef idx="0">
-            <a:schemeClr val="accent1"/>
-          </a:fillRef>
-          <a:effectRef idx="0">
-            <a:schemeClr val="accent1"/>
-          </a:effectRef>
-          <a:fontRef idx="minor">
-            <a:schemeClr val="tx1"/>
-          </a:fontRef>
-        </p:style>
-      </p:cxnSp>
       <p:sp>
         <p:nvSpPr>
           <p:cNvPr id="31" name="Arc 30">
@@ -3673,8 +3590,8 @@
           </a:p>
         </p:txBody>
       </p:sp>
-      <mc:AlternateContent xmlns:mc="http://schemas.openxmlformats.org/markup-compatibility/2006">
-        <mc:Choice xmlns:a14="http://schemas.microsoft.com/office/drawing/2010/main" Requires="a14">
+      <mc:AlternateContent xmlns:mc="http://schemas.openxmlformats.org/markup-compatibility/2006" xmlns:a14="http://schemas.microsoft.com/office/drawing/2010/main">
+        <mc:Choice Requires="a14">
           <p:sp>
             <p:nvSpPr>
               <p:cNvPr id="32" name="TextBox 31">
@@ -3703,6 +3620,7 @@
               </a:bodyPr>
               <a:lstStyle/>
               <a:p>
+                <a:pPr/>
                 <a14:m>
                   <m:oMathPara xmlns:m="http://schemas.openxmlformats.org/officeDocument/2006/math">
                     <m:oMathParaPr>
@@ -3766,7 +3684,7 @@
             </p:txBody>
           </p:sp>
         </mc:Choice>
-        <mc:Fallback>
+        <mc:Fallback xmlns="">
           <p:sp>
             <p:nvSpPr>
               <p:cNvPr id="32" name="TextBox 31">
@@ -3927,8 +3845,8 @@
           </a:fontRef>
         </p:style>
       </p:cxnSp>
-      <mc:AlternateContent xmlns:mc="http://schemas.openxmlformats.org/markup-compatibility/2006">
-        <mc:Choice xmlns:a14="http://schemas.microsoft.com/office/drawing/2010/main" Requires="a14">
+      <mc:AlternateContent xmlns:mc="http://schemas.openxmlformats.org/markup-compatibility/2006" xmlns:a14="http://schemas.microsoft.com/office/drawing/2010/main">
+        <mc:Choice Requires="a14">
           <p:sp>
             <p:nvSpPr>
               <p:cNvPr id="37" name="TextBox 36">
@@ -3957,6 +3875,7 @@
               </a:bodyPr>
               <a:lstStyle/>
               <a:p>
+                <a:pPr/>
                 <a14:m>
                   <m:oMathPara xmlns:m="http://schemas.openxmlformats.org/officeDocument/2006/math">
                     <m:oMathParaPr>
@@ -3996,7 +3915,7 @@
             </p:txBody>
           </p:sp>
         </mc:Choice>
-        <mc:Fallback>
+        <mc:Fallback xmlns="">
           <p:sp>
             <p:nvSpPr>
               <p:cNvPr id="37" name="TextBox 36">
@@ -4087,13 +4006,12 @@
           </p:cNvPr>
           <p:cNvCxnSpPr>
             <a:cxnSpLocks/>
-            <a:endCxn id="4" idx="2"/>
           </p:cNvCxnSpPr>
           <p:nvPr/>
         </p:nvCxnSpPr>
         <p:spPr>
           <a:xfrm flipH="1" flipV="1">
-            <a:off x="216583" y="3429000"/>
+            <a:off x="216583" y="3658300"/>
             <a:ext cx="1652526" cy="3772"/>
           </a:xfrm>
           <a:prstGeom prst="straightConnector1">
@@ -4138,7 +4056,7 @@
             </p:nvSpPr>
             <p:spPr>
               <a:xfrm>
-                <a:off x="476454" y="3430888"/>
+                <a:off x="494216" y="3734826"/>
                 <a:ext cx="1199046" cy="523220"/>
               </a:xfrm>
               <a:prstGeom prst="rect">
@@ -4152,6 +4070,7 @@
               </a:bodyPr>
               <a:lstStyle/>
               <a:p>
+                <a:pPr/>
                 <a14:m>
                   <m:oMathPara xmlns:m="http://schemas.openxmlformats.org/officeDocument/2006/math">
                     <m:oMathParaPr>
@@ -4221,7 +4140,7 @@
             </p:nvSpPr>
             <p:spPr>
               <a:xfrm>
-                <a:off x="476454" y="3430888"/>
+                <a:off x="494216" y="3734826"/>
                 <a:ext cx="1199046" cy="523220"/>
               </a:xfrm>
               <a:prstGeom prst="rect">
@@ -4239,7 +4158,7 @@
               <a:lstStyle/>
               <a:p>
                 <a:r>
-                  <a:rPr lang="en-GB">
+                  <a:rPr lang="fr-FR">
                     <a:noFill/>
                   </a:rPr>
                   <a:t> </a:t>
@@ -4281,183 +4200,6 @@
           </a:p>
         </p:txBody>
       </p:sp>
-      <p:cxnSp>
-        <p:nvCxnSpPr>
-          <p:cNvPr id="76" name="Straight Arrow Connector 75">
-            <a:extLst>
-              <a:ext uri="{FF2B5EF4-FFF2-40B4-BE49-F238E27FC236}">
-                <a16:creationId xmlns:a16="http://schemas.microsoft.com/office/drawing/2014/main" id="{A9B6EBA3-A88C-2F48-BEB5-EE536A95DEBB}"/>
-              </a:ext>
-            </a:extLst>
-          </p:cNvPr>
-          <p:cNvCxnSpPr>
-            <a:cxnSpLocks/>
-          </p:cNvCxnSpPr>
-          <p:nvPr/>
-        </p:nvCxnSpPr>
-        <p:spPr>
-          <a:xfrm flipV="1">
-            <a:off x="1869109" y="4427323"/>
-            <a:ext cx="9185363" cy="4010"/>
-          </a:xfrm>
-          <a:prstGeom prst="straightConnector1">
-            <a:avLst/>
-          </a:prstGeom>
-          <a:ln w="25400">
-            <a:solidFill>
-              <a:schemeClr val="tx1"/>
-            </a:solidFill>
-            <a:headEnd type="triangle"/>
-            <a:tailEnd type="triangle"/>
-          </a:ln>
-        </p:spPr>
-        <p:style>
-          <a:lnRef idx="1">
-            <a:schemeClr val="accent1"/>
-          </a:lnRef>
-          <a:fillRef idx="0">
-            <a:schemeClr val="accent1"/>
-          </a:fillRef>
-          <a:effectRef idx="0">
-            <a:schemeClr val="accent1"/>
-          </a:effectRef>
-          <a:fontRef idx="minor">
-            <a:schemeClr val="tx1"/>
-          </a:fontRef>
-        </p:style>
-      </p:cxnSp>
-      <mc:AlternateContent xmlns:mc="http://schemas.openxmlformats.org/markup-compatibility/2006">
-        <mc:Choice xmlns:a14="http://schemas.microsoft.com/office/drawing/2010/main" Requires="a14">
-          <p:sp>
-            <p:nvSpPr>
-              <p:cNvPr id="77" name="TextBox 76">
-                <a:extLst>
-                  <a:ext uri="{FF2B5EF4-FFF2-40B4-BE49-F238E27FC236}">
-                    <a16:creationId xmlns:a16="http://schemas.microsoft.com/office/drawing/2014/main" id="{A974FF21-717C-E04F-81FA-74900B848B30}"/>
-                  </a:ext>
-                </a:extLst>
-              </p:cNvPr>
-              <p:cNvSpPr txBox="1"/>
-              <p:nvPr/>
-            </p:nvSpPr>
-            <p:spPr>
-              <a:xfrm>
-                <a:off x="6096017" y="4423102"/>
-                <a:ext cx="1223412" cy="523220"/>
-              </a:xfrm>
-              <a:prstGeom prst="rect">
-                <a:avLst/>
-              </a:prstGeom>
-              <a:noFill/>
-            </p:spPr>
-            <p:txBody>
-              <a:bodyPr wrap="none" rtlCol="0">
-                <a:spAutoFit/>
-              </a:bodyPr>
-              <a:lstStyle/>
-              <a:p>
-                <a14:m>
-                  <m:oMathPara xmlns:m="http://schemas.openxmlformats.org/officeDocument/2006/math">
-                    <m:oMathParaPr>
-                      <m:jc m:val="centerGroup"/>
-                    </m:oMathParaPr>
-                    <m:oMath xmlns:m="http://schemas.openxmlformats.org/officeDocument/2006/math">
-                      <m:sSub>
-                        <m:sSubPr>
-                          <m:ctrlPr>
-                            <a:rPr lang="en-US" sz="2800" b="0" i="1" smtClean="0">
-                              <a:latin typeface="Cambria Math" panose="02040503050406030204" pitchFamily="18" charset="0"/>
-                            </a:rPr>
-                          </m:ctrlPr>
-                        </m:sSubPr>
-                        <m:e>
-                          <m:r>
-                            <a:rPr lang="en-US" sz="2800" b="0" i="1" smtClean="0">
-                              <a:latin typeface="Cambria Math" panose="02040503050406030204" pitchFamily="18" charset="0"/>
-                            </a:rPr>
-                            <m:t>𝐷</m:t>
-                          </m:r>
-                        </m:e>
-                        <m:sub>
-                          <m:r>
-                            <a:rPr lang="en-US" sz="2800" b="0" i="1" smtClean="0">
-                              <a:latin typeface="Cambria Math" panose="02040503050406030204" pitchFamily="18" charset="0"/>
-                            </a:rPr>
-                            <m:t>𝑀</m:t>
-                          </m:r>
-                        </m:sub>
-                      </m:sSub>
-                      <m:r>
-                        <a:rPr lang="en-US" sz="2800" b="0" i="1" smtClean="0">
-                          <a:latin typeface="Cambria Math" panose="02040503050406030204" pitchFamily="18" charset="0"/>
-                        </a:rPr>
-                        <m:t>(</m:t>
-                      </m:r>
-                      <m:r>
-                        <a:rPr lang="en-US" sz="2800" b="0" i="1" smtClean="0">
-                          <a:latin typeface="Cambria Math" panose="02040503050406030204" pitchFamily="18" charset="0"/>
-                        </a:rPr>
-                        <m:t>𝑧</m:t>
-                      </m:r>
-                      <m:r>
-                        <a:rPr lang="en-US" sz="2800" b="0" i="1" smtClean="0">
-                          <a:latin typeface="Cambria Math" panose="02040503050406030204" pitchFamily="18" charset="0"/>
-                        </a:rPr>
-                        <m:t>)</m:t>
-                      </m:r>
-                    </m:oMath>
-                  </m:oMathPara>
-                </a14:m>
-                <a:endParaRPr lang="en-GB" sz="2800" dirty="0"/>
-              </a:p>
-            </p:txBody>
-          </p:sp>
-        </mc:Choice>
-        <mc:Fallback>
-          <p:sp>
-            <p:nvSpPr>
-              <p:cNvPr id="77" name="TextBox 76">
-                <a:extLst>
-                  <a:ext uri="{FF2B5EF4-FFF2-40B4-BE49-F238E27FC236}">
-                    <a16:creationId xmlns:a16="http://schemas.microsoft.com/office/drawing/2014/main" id="{A974FF21-717C-E04F-81FA-74900B848B30}"/>
-                  </a:ext>
-                </a:extLst>
-              </p:cNvPr>
-              <p:cNvSpPr txBox="1">
-                <a:spLocks noRot="1" noChangeAspect="1" noMove="1" noResize="1" noEditPoints="1" noAdjustHandles="1" noChangeArrowheads="1" noChangeShapeType="1" noTextEdit="1"/>
-              </p:cNvSpPr>
-              <p:nvPr/>
-            </p:nvSpPr>
-            <p:spPr>
-              <a:xfrm>
-                <a:off x="6096017" y="4423102"/>
-                <a:ext cx="1223412" cy="523220"/>
-              </a:xfrm>
-              <a:prstGeom prst="rect">
-                <a:avLst/>
-              </a:prstGeom>
-              <a:blipFill>
-                <a:blip r:embed="rId6"/>
-                <a:stretch>
-                  <a:fillRect r="-2083" b="-17073"/>
-                </a:stretch>
-              </a:blipFill>
-            </p:spPr>
-            <p:txBody>
-              <a:bodyPr/>
-              <a:lstStyle/>
-              <a:p>
-                <a:r>
-                  <a:rPr lang="en-GB">
-                    <a:noFill/>
-                  </a:rPr>
-                  <a:t> </a:t>
-                </a:r>
-              </a:p>
-            </p:txBody>
-          </p:sp>
-        </mc:Fallback>
-      </mc:AlternateContent>
       <p:cxnSp>
         <p:nvCxnSpPr>
           <p:cNvPr id="1034" name="Straight Connector 1033">
@@ -4503,1094 +4245,299 @@
           </a:fontRef>
         </p:style>
       </p:cxnSp>
-      <p:sp>
-        <p:nvSpPr>
-          <p:cNvPr id="1036" name="Oval 1035">
-            <a:extLst>
-              <a:ext uri="{FF2B5EF4-FFF2-40B4-BE49-F238E27FC236}">
-                <a16:creationId xmlns:a16="http://schemas.microsoft.com/office/drawing/2014/main" id="{2C2AA01A-5442-3F46-979D-1145C6F5AE18}"/>
-              </a:ext>
-            </a:extLst>
-          </p:cNvPr>
-          <p:cNvSpPr/>
+      <p:grpSp>
+        <p:nvGrpSpPr>
+          <p:cNvPr id="2" name="Group 1">
+            <a:extLst>
+              <a:ext uri="{FF2B5EF4-FFF2-40B4-BE49-F238E27FC236}">
+                <a16:creationId xmlns:a16="http://schemas.microsoft.com/office/drawing/2014/main" id="{B2B7EDB1-4AFE-874F-9D65-489CEB43791B}"/>
+              </a:ext>
+            </a:extLst>
+          </p:cNvPr>
+          <p:cNvGrpSpPr/>
           <p:nvPr/>
-        </p:nvSpPr>
-        <p:spPr>
+        </p:nvGrpSpPr>
+        <p:grpSpPr>
           <a:xfrm>
-            <a:off x="1765088" y="5045042"/>
-            <a:ext cx="248856" cy="150351"/>
+            <a:off x="3329363" y="3275295"/>
+            <a:ext cx="464432" cy="328689"/>
+            <a:chOff x="3329061" y="3246341"/>
+            <a:chExt cx="464432" cy="328689"/>
           </a:xfrm>
-          <a:prstGeom prst="ellipse">
-            <a:avLst/>
-          </a:prstGeom>
-          <a:noFill/>
-          <a:ln w="19050">
-            <a:solidFill>
-              <a:schemeClr val="tx1"/>
-            </a:solidFill>
-          </a:ln>
-        </p:spPr>
-        <p:style>
-          <a:lnRef idx="2">
-            <a:schemeClr val="accent1">
-              <a:shade val="50000"/>
-            </a:schemeClr>
-          </a:lnRef>
-          <a:fillRef idx="1">
-            <a:schemeClr val="accent1"/>
-          </a:fillRef>
-          <a:effectRef idx="0">
-            <a:schemeClr val="accent1"/>
-          </a:effectRef>
-          <a:fontRef idx="minor">
-            <a:schemeClr val="lt1"/>
-          </a:fontRef>
-        </p:style>
-        <p:txBody>
-          <a:bodyPr rtlCol="0" anchor="ctr"/>
-          <a:lstStyle/>
-          <a:p>
-            <a:pPr algn="ctr"/>
-            <a:endParaRPr lang="en-GB"/>
-          </a:p>
-        </p:txBody>
-      </p:sp>
-      <p:sp>
-        <p:nvSpPr>
-          <p:cNvPr id="1042" name="Freeform 1041">
-            <a:extLst>
-              <a:ext uri="{FF2B5EF4-FFF2-40B4-BE49-F238E27FC236}">
-                <a16:creationId xmlns:a16="http://schemas.microsoft.com/office/drawing/2014/main" id="{07F6D64F-E68B-954A-9FA7-011CD2033093}"/>
-              </a:ext>
-            </a:extLst>
-          </p:cNvPr>
-          <p:cNvSpPr/>
-          <p:nvPr/>
-        </p:nvSpPr>
-        <p:spPr>
-          <a:xfrm>
-            <a:off x="1657298" y="4954936"/>
-            <a:ext cx="397411" cy="240457"/>
-          </a:xfrm>
-          <a:custGeom>
-            <a:avLst/>
-            <a:gdLst>
-              <a:gd name="connsiteX0" fmla="*/ 243405 w 397411"/>
-              <a:gd name="connsiteY0" fmla="*/ 240457 h 240457"/>
-              <a:gd name="connsiteX1" fmla="*/ 382064 w 397411"/>
-              <a:gd name="connsiteY1" fmla="*/ 187992 h 240457"/>
-              <a:gd name="connsiteX2" fmla="*/ 374569 w 397411"/>
-              <a:gd name="connsiteY2" fmla="*/ 79313 h 240457"/>
-              <a:gd name="connsiteX3" fmla="*/ 209678 w 397411"/>
-              <a:gd name="connsiteY3" fmla="*/ 615 h 240457"/>
-              <a:gd name="connsiteX4" fmla="*/ 3563 w 397411"/>
-              <a:gd name="connsiteY4" fmla="*/ 49333 h 240457"/>
-            </a:gdLst>
-            <a:ahLst/>
-            <a:cxnLst>
-              <a:cxn ang="0">
-                <a:pos x="connsiteX0" y="connsiteY0"/>
-              </a:cxn>
-              <a:cxn ang="0">
-                <a:pos x="connsiteX1" y="connsiteY1"/>
-              </a:cxn>
-              <a:cxn ang="0">
-                <a:pos x="connsiteX2" y="connsiteY2"/>
-              </a:cxn>
-              <a:cxn ang="0">
-                <a:pos x="connsiteX3" y="connsiteY3"/>
-              </a:cxn>
-              <a:cxn ang="0">
-                <a:pos x="connsiteX4" y="connsiteY4"/>
-              </a:cxn>
-            </a:cxnLst>
-            <a:rect l="l" t="t" r="r" b="b"/>
-            <a:pathLst>
-              <a:path w="397411" h="240457">
-                <a:moveTo>
-                  <a:pt x="243405" y="240457"/>
-                </a:moveTo>
-                <a:cubicBezTo>
-                  <a:pt x="301804" y="227653"/>
-                  <a:pt x="360203" y="214849"/>
-                  <a:pt x="382064" y="187992"/>
-                </a:cubicBezTo>
-                <a:cubicBezTo>
-                  <a:pt x="403925" y="161135"/>
-                  <a:pt x="403300" y="110542"/>
-                  <a:pt x="374569" y="79313"/>
-                </a:cubicBezTo>
-                <a:cubicBezTo>
-                  <a:pt x="345838" y="48083"/>
-                  <a:pt x="271512" y="5612"/>
-                  <a:pt x="209678" y="615"/>
-                </a:cubicBezTo>
-                <a:cubicBezTo>
-                  <a:pt x="147844" y="-4382"/>
-                  <a:pt x="-27042" y="21851"/>
-                  <a:pt x="3563" y="49333"/>
-                </a:cubicBezTo>
-              </a:path>
-            </a:pathLst>
-          </a:custGeom>
-          <a:noFill/>
-          <a:ln w="19050">
-            <a:solidFill>
-              <a:schemeClr val="tx1"/>
-            </a:solidFill>
-          </a:ln>
-        </p:spPr>
-        <p:style>
-          <a:lnRef idx="2">
-            <a:schemeClr val="accent1">
-              <a:shade val="50000"/>
-            </a:schemeClr>
-          </a:lnRef>
-          <a:fillRef idx="1">
-            <a:schemeClr val="accent1"/>
-          </a:fillRef>
-          <a:effectRef idx="0">
-            <a:schemeClr val="accent1"/>
-          </a:effectRef>
-          <a:fontRef idx="minor">
-            <a:schemeClr val="lt1"/>
-          </a:fontRef>
-        </p:style>
-        <p:txBody>
-          <a:bodyPr rtlCol="0" anchor="ctr"/>
-          <a:lstStyle/>
-          <a:p>
-            <a:pPr algn="ctr"/>
-            <a:endParaRPr lang="en-GB"/>
-          </a:p>
-        </p:txBody>
-      </p:sp>
-      <p:sp>
-        <p:nvSpPr>
-          <p:cNvPr id="90" name="Freeform 89">
-            <a:extLst>
-              <a:ext uri="{FF2B5EF4-FFF2-40B4-BE49-F238E27FC236}">
-                <a16:creationId xmlns:a16="http://schemas.microsoft.com/office/drawing/2014/main" id="{E74E2FC4-A7F7-1749-B4E0-74FA04E3FCD8}"/>
-              </a:ext>
-            </a:extLst>
-          </p:cNvPr>
-          <p:cNvSpPr/>
-          <p:nvPr/>
-        </p:nvSpPr>
-        <p:spPr>
-          <a:xfrm rot="10800000">
-            <a:off x="1724319" y="5043168"/>
-            <a:ext cx="397411" cy="240457"/>
-          </a:xfrm>
-          <a:custGeom>
-            <a:avLst/>
-            <a:gdLst>
-              <a:gd name="connsiteX0" fmla="*/ 243405 w 397411"/>
-              <a:gd name="connsiteY0" fmla="*/ 240457 h 240457"/>
-              <a:gd name="connsiteX1" fmla="*/ 382064 w 397411"/>
-              <a:gd name="connsiteY1" fmla="*/ 187992 h 240457"/>
-              <a:gd name="connsiteX2" fmla="*/ 374569 w 397411"/>
-              <a:gd name="connsiteY2" fmla="*/ 79313 h 240457"/>
-              <a:gd name="connsiteX3" fmla="*/ 209678 w 397411"/>
-              <a:gd name="connsiteY3" fmla="*/ 615 h 240457"/>
-              <a:gd name="connsiteX4" fmla="*/ 3563 w 397411"/>
-              <a:gd name="connsiteY4" fmla="*/ 49333 h 240457"/>
-            </a:gdLst>
-            <a:ahLst/>
-            <a:cxnLst>
-              <a:cxn ang="0">
-                <a:pos x="connsiteX0" y="connsiteY0"/>
-              </a:cxn>
-              <a:cxn ang="0">
-                <a:pos x="connsiteX1" y="connsiteY1"/>
-              </a:cxn>
-              <a:cxn ang="0">
-                <a:pos x="connsiteX2" y="connsiteY2"/>
-              </a:cxn>
-              <a:cxn ang="0">
-                <a:pos x="connsiteX3" y="connsiteY3"/>
-              </a:cxn>
-              <a:cxn ang="0">
-                <a:pos x="connsiteX4" y="connsiteY4"/>
-              </a:cxn>
-            </a:cxnLst>
-            <a:rect l="l" t="t" r="r" b="b"/>
-            <a:pathLst>
-              <a:path w="397411" h="240457">
-                <a:moveTo>
-                  <a:pt x="243405" y="240457"/>
-                </a:moveTo>
-                <a:cubicBezTo>
-                  <a:pt x="301804" y="227653"/>
-                  <a:pt x="360203" y="214849"/>
-                  <a:pt x="382064" y="187992"/>
-                </a:cubicBezTo>
-                <a:cubicBezTo>
-                  <a:pt x="403925" y="161135"/>
-                  <a:pt x="403300" y="110542"/>
-                  <a:pt x="374569" y="79313"/>
-                </a:cubicBezTo>
-                <a:cubicBezTo>
-                  <a:pt x="345838" y="48083"/>
-                  <a:pt x="271512" y="5612"/>
-                  <a:pt x="209678" y="615"/>
-                </a:cubicBezTo>
-                <a:cubicBezTo>
-                  <a:pt x="147844" y="-4382"/>
-                  <a:pt x="-27042" y="21851"/>
-                  <a:pt x="3563" y="49333"/>
-                </a:cubicBezTo>
-              </a:path>
-            </a:pathLst>
-          </a:custGeom>
-          <a:noFill/>
-          <a:ln w="19050">
-            <a:solidFill>
-              <a:schemeClr val="tx1"/>
-            </a:solidFill>
-          </a:ln>
-        </p:spPr>
-        <p:style>
-          <a:lnRef idx="2">
-            <a:schemeClr val="accent1">
-              <a:shade val="50000"/>
-            </a:schemeClr>
-          </a:lnRef>
-          <a:fillRef idx="1">
-            <a:schemeClr val="accent1"/>
-          </a:fillRef>
-          <a:effectRef idx="0">
-            <a:schemeClr val="accent1"/>
-          </a:effectRef>
-          <a:fontRef idx="minor">
-            <a:schemeClr val="lt1"/>
-          </a:fontRef>
-        </p:style>
-        <p:txBody>
-          <a:bodyPr rtlCol="0" anchor="ctr"/>
-          <a:lstStyle/>
-          <a:p>
-            <a:pPr algn="ctr"/>
-            <a:endParaRPr lang="en-GB"/>
-          </a:p>
-        </p:txBody>
-      </p:sp>
-      <p:sp>
-        <p:nvSpPr>
-          <p:cNvPr id="94" name="Oval 93">
-            <a:extLst>
-              <a:ext uri="{FF2B5EF4-FFF2-40B4-BE49-F238E27FC236}">
-                <a16:creationId xmlns:a16="http://schemas.microsoft.com/office/drawing/2014/main" id="{C5574111-C877-3540-92BB-8342AAE20749}"/>
-              </a:ext>
-            </a:extLst>
-          </p:cNvPr>
-          <p:cNvSpPr/>
-          <p:nvPr/>
-        </p:nvSpPr>
-        <p:spPr>
-          <a:xfrm>
-            <a:off x="1734796" y="1700884"/>
-            <a:ext cx="248856" cy="150351"/>
-          </a:xfrm>
-          <a:prstGeom prst="ellipse">
-            <a:avLst/>
-          </a:prstGeom>
-          <a:noFill/>
-          <a:ln w="19050">
-            <a:solidFill>
-              <a:schemeClr val="tx1"/>
-            </a:solidFill>
-          </a:ln>
-        </p:spPr>
-        <p:style>
-          <a:lnRef idx="2">
-            <a:schemeClr val="accent1">
-              <a:shade val="50000"/>
-            </a:schemeClr>
-          </a:lnRef>
-          <a:fillRef idx="1">
-            <a:schemeClr val="accent1"/>
-          </a:fillRef>
-          <a:effectRef idx="0">
-            <a:schemeClr val="accent1"/>
-          </a:effectRef>
-          <a:fontRef idx="minor">
-            <a:schemeClr val="lt1"/>
-          </a:fontRef>
-        </p:style>
-        <p:txBody>
-          <a:bodyPr rtlCol="0" anchor="ctr"/>
-          <a:lstStyle/>
-          <a:p>
-            <a:pPr algn="ctr"/>
-            <a:endParaRPr lang="en-GB"/>
-          </a:p>
-        </p:txBody>
-      </p:sp>
-      <p:sp>
-        <p:nvSpPr>
-          <p:cNvPr id="95" name="Freeform 94">
-            <a:extLst>
-              <a:ext uri="{FF2B5EF4-FFF2-40B4-BE49-F238E27FC236}">
-                <a16:creationId xmlns:a16="http://schemas.microsoft.com/office/drawing/2014/main" id="{DA741D5B-ADEE-4C4D-89DA-EBA591780A37}"/>
-              </a:ext>
-            </a:extLst>
-          </p:cNvPr>
-          <p:cNvSpPr/>
-          <p:nvPr/>
-        </p:nvSpPr>
-        <p:spPr>
-          <a:xfrm>
-            <a:off x="1627006" y="1610778"/>
-            <a:ext cx="397411" cy="240457"/>
-          </a:xfrm>
-          <a:custGeom>
-            <a:avLst/>
-            <a:gdLst>
-              <a:gd name="connsiteX0" fmla="*/ 243405 w 397411"/>
-              <a:gd name="connsiteY0" fmla="*/ 240457 h 240457"/>
-              <a:gd name="connsiteX1" fmla="*/ 382064 w 397411"/>
-              <a:gd name="connsiteY1" fmla="*/ 187992 h 240457"/>
-              <a:gd name="connsiteX2" fmla="*/ 374569 w 397411"/>
-              <a:gd name="connsiteY2" fmla="*/ 79313 h 240457"/>
-              <a:gd name="connsiteX3" fmla="*/ 209678 w 397411"/>
-              <a:gd name="connsiteY3" fmla="*/ 615 h 240457"/>
-              <a:gd name="connsiteX4" fmla="*/ 3563 w 397411"/>
-              <a:gd name="connsiteY4" fmla="*/ 49333 h 240457"/>
-            </a:gdLst>
-            <a:ahLst/>
-            <a:cxnLst>
-              <a:cxn ang="0">
-                <a:pos x="connsiteX0" y="connsiteY0"/>
-              </a:cxn>
-              <a:cxn ang="0">
-                <a:pos x="connsiteX1" y="connsiteY1"/>
-              </a:cxn>
-              <a:cxn ang="0">
-                <a:pos x="connsiteX2" y="connsiteY2"/>
-              </a:cxn>
-              <a:cxn ang="0">
-                <a:pos x="connsiteX3" y="connsiteY3"/>
-              </a:cxn>
-              <a:cxn ang="0">
-                <a:pos x="connsiteX4" y="connsiteY4"/>
-              </a:cxn>
-            </a:cxnLst>
-            <a:rect l="l" t="t" r="r" b="b"/>
-            <a:pathLst>
-              <a:path w="397411" h="240457">
-                <a:moveTo>
-                  <a:pt x="243405" y="240457"/>
-                </a:moveTo>
-                <a:cubicBezTo>
-                  <a:pt x="301804" y="227653"/>
-                  <a:pt x="360203" y="214849"/>
-                  <a:pt x="382064" y="187992"/>
-                </a:cubicBezTo>
-                <a:cubicBezTo>
-                  <a:pt x="403925" y="161135"/>
-                  <a:pt x="403300" y="110542"/>
-                  <a:pt x="374569" y="79313"/>
-                </a:cubicBezTo>
-                <a:cubicBezTo>
-                  <a:pt x="345838" y="48083"/>
-                  <a:pt x="271512" y="5612"/>
-                  <a:pt x="209678" y="615"/>
-                </a:cubicBezTo>
-                <a:cubicBezTo>
-                  <a:pt x="147844" y="-4382"/>
-                  <a:pt x="-27042" y="21851"/>
-                  <a:pt x="3563" y="49333"/>
-                </a:cubicBezTo>
-              </a:path>
-            </a:pathLst>
-          </a:custGeom>
-          <a:noFill/>
-          <a:ln w="19050">
-            <a:solidFill>
-              <a:schemeClr val="tx1"/>
-            </a:solidFill>
-          </a:ln>
-        </p:spPr>
-        <p:style>
-          <a:lnRef idx="2">
-            <a:schemeClr val="accent1">
-              <a:shade val="50000"/>
-            </a:schemeClr>
-          </a:lnRef>
-          <a:fillRef idx="1">
-            <a:schemeClr val="accent1"/>
-          </a:fillRef>
-          <a:effectRef idx="0">
-            <a:schemeClr val="accent1"/>
-          </a:effectRef>
-          <a:fontRef idx="minor">
-            <a:schemeClr val="lt1"/>
-          </a:fontRef>
-        </p:style>
-        <p:txBody>
-          <a:bodyPr rtlCol="0" anchor="ctr"/>
-          <a:lstStyle/>
-          <a:p>
-            <a:pPr algn="ctr"/>
-            <a:endParaRPr lang="en-GB"/>
-          </a:p>
-        </p:txBody>
-      </p:sp>
-      <p:sp>
-        <p:nvSpPr>
-          <p:cNvPr id="96" name="Freeform 95">
-            <a:extLst>
-              <a:ext uri="{FF2B5EF4-FFF2-40B4-BE49-F238E27FC236}">
-                <a16:creationId xmlns:a16="http://schemas.microsoft.com/office/drawing/2014/main" id="{DA0F4E01-A591-4D4F-AB67-03478B99F71E}"/>
-              </a:ext>
-            </a:extLst>
-          </p:cNvPr>
-          <p:cNvSpPr/>
-          <p:nvPr/>
-        </p:nvSpPr>
-        <p:spPr>
-          <a:xfrm rot="10800000">
-            <a:off x="1694027" y="1699010"/>
-            <a:ext cx="397411" cy="240457"/>
-          </a:xfrm>
-          <a:custGeom>
-            <a:avLst/>
-            <a:gdLst>
-              <a:gd name="connsiteX0" fmla="*/ 243405 w 397411"/>
-              <a:gd name="connsiteY0" fmla="*/ 240457 h 240457"/>
-              <a:gd name="connsiteX1" fmla="*/ 382064 w 397411"/>
-              <a:gd name="connsiteY1" fmla="*/ 187992 h 240457"/>
-              <a:gd name="connsiteX2" fmla="*/ 374569 w 397411"/>
-              <a:gd name="connsiteY2" fmla="*/ 79313 h 240457"/>
-              <a:gd name="connsiteX3" fmla="*/ 209678 w 397411"/>
-              <a:gd name="connsiteY3" fmla="*/ 615 h 240457"/>
-              <a:gd name="connsiteX4" fmla="*/ 3563 w 397411"/>
-              <a:gd name="connsiteY4" fmla="*/ 49333 h 240457"/>
-            </a:gdLst>
-            <a:ahLst/>
-            <a:cxnLst>
-              <a:cxn ang="0">
-                <a:pos x="connsiteX0" y="connsiteY0"/>
-              </a:cxn>
-              <a:cxn ang="0">
-                <a:pos x="connsiteX1" y="connsiteY1"/>
-              </a:cxn>
-              <a:cxn ang="0">
-                <a:pos x="connsiteX2" y="connsiteY2"/>
-              </a:cxn>
-              <a:cxn ang="0">
-                <a:pos x="connsiteX3" y="connsiteY3"/>
-              </a:cxn>
-              <a:cxn ang="0">
-                <a:pos x="connsiteX4" y="connsiteY4"/>
-              </a:cxn>
-            </a:cxnLst>
-            <a:rect l="l" t="t" r="r" b="b"/>
-            <a:pathLst>
-              <a:path w="397411" h="240457">
-                <a:moveTo>
-                  <a:pt x="243405" y="240457"/>
-                </a:moveTo>
-                <a:cubicBezTo>
-                  <a:pt x="301804" y="227653"/>
-                  <a:pt x="360203" y="214849"/>
-                  <a:pt x="382064" y="187992"/>
-                </a:cubicBezTo>
-                <a:cubicBezTo>
-                  <a:pt x="403925" y="161135"/>
-                  <a:pt x="403300" y="110542"/>
-                  <a:pt x="374569" y="79313"/>
-                </a:cubicBezTo>
-                <a:cubicBezTo>
-                  <a:pt x="345838" y="48083"/>
-                  <a:pt x="271512" y="5612"/>
-                  <a:pt x="209678" y="615"/>
-                </a:cubicBezTo>
-                <a:cubicBezTo>
-                  <a:pt x="147844" y="-4382"/>
-                  <a:pt x="-27042" y="21851"/>
-                  <a:pt x="3563" y="49333"/>
-                </a:cubicBezTo>
-              </a:path>
-            </a:pathLst>
-          </a:custGeom>
-          <a:noFill/>
-          <a:ln w="19050">
-            <a:solidFill>
-              <a:schemeClr val="tx1"/>
-            </a:solidFill>
-          </a:ln>
-        </p:spPr>
-        <p:style>
-          <a:lnRef idx="2">
-            <a:schemeClr val="accent1">
-              <a:shade val="50000"/>
-            </a:schemeClr>
-          </a:lnRef>
-          <a:fillRef idx="1">
-            <a:schemeClr val="accent1"/>
-          </a:fillRef>
-          <a:effectRef idx="0">
-            <a:schemeClr val="accent1"/>
-          </a:effectRef>
-          <a:fontRef idx="minor">
-            <a:schemeClr val="lt1"/>
-          </a:fontRef>
-        </p:style>
-        <p:txBody>
-          <a:bodyPr rtlCol="0" anchor="ctr"/>
-          <a:lstStyle/>
-          <a:p>
-            <a:pPr algn="ctr"/>
-            <a:endParaRPr lang="en-GB"/>
-          </a:p>
-        </p:txBody>
-      </p:sp>
-      <p:sp>
-        <p:nvSpPr>
-          <p:cNvPr id="97" name="Oval 96">
-            <a:extLst>
-              <a:ext uri="{FF2B5EF4-FFF2-40B4-BE49-F238E27FC236}">
-                <a16:creationId xmlns:a16="http://schemas.microsoft.com/office/drawing/2014/main" id="{5079A29C-D964-AC4C-BCD6-8DEB56D97433}"/>
-              </a:ext>
-            </a:extLst>
-          </p:cNvPr>
-          <p:cNvSpPr/>
-          <p:nvPr/>
-        </p:nvSpPr>
-        <p:spPr>
-          <a:xfrm>
-            <a:off x="3426966" y="3336447"/>
-            <a:ext cx="248856" cy="150351"/>
-          </a:xfrm>
-          <a:prstGeom prst="ellipse">
-            <a:avLst/>
-          </a:prstGeom>
-          <a:noFill/>
-          <a:ln w="19050">
-            <a:solidFill>
-              <a:schemeClr val="tx1"/>
-            </a:solidFill>
-          </a:ln>
-        </p:spPr>
-        <p:style>
-          <a:lnRef idx="2">
-            <a:schemeClr val="accent1">
-              <a:shade val="50000"/>
-            </a:schemeClr>
-          </a:lnRef>
-          <a:fillRef idx="1">
-            <a:schemeClr val="accent1"/>
-          </a:fillRef>
-          <a:effectRef idx="0">
-            <a:schemeClr val="accent1"/>
-          </a:effectRef>
-          <a:fontRef idx="minor">
-            <a:schemeClr val="lt1"/>
-          </a:fontRef>
-        </p:style>
-        <p:txBody>
-          <a:bodyPr rtlCol="0" anchor="ctr"/>
-          <a:lstStyle/>
-          <a:p>
-            <a:pPr algn="ctr"/>
-            <a:endParaRPr lang="en-GB"/>
-          </a:p>
-        </p:txBody>
-      </p:sp>
-      <p:sp>
-        <p:nvSpPr>
-          <p:cNvPr id="98" name="Freeform 97">
-            <a:extLst>
-              <a:ext uri="{FF2B5EF4-FFF2-40B4-BE49-F238E27FC236}">
-                <a16:creationId xmlns:a16="http://schemas.microsoft.com/office/drawing/2014/main" id="{457A0056-2FBE-1C4C-B333-D640D241E5E8}"/>
-              </a:ext>
-            </a:extLst>
-          </p:cNvPr>
-          <p:cNvSpPr/>
-          <p:nvPr/>
-        </p:nvSpPr>
-        <p:spPr>
-          <a:xfrm>
-            <a:off x="3319176" y="3246341"/>
-            <a:ext cx="397411" cy="240457"/>
-          </a:xfrm>
-          <a:custGeom>
-            <a:avLst/>
-            <a:gdLst>
-              <a:gd name="connsiteX0" fmla="*/ 243405 w 397411"/>
-              <a:gd name="connsiteY0" fmla="*/ 240457 h 240457"/>
-              <a:gd name="connsiteX1" fmla="*/ 382064 w 397411"/>
-              <a:gd name="connsiteY1" fmla="*/ 187992 h 240457"/>
-              <a:gd name="connsiteX2" fmla="*/ 374569 w 397411"/>
-              <a:gd name="connsiteY2" fmla="*/ 79313 h 240457"/>
-              <a:gd name="connsiteX3" fmla="*/ 209678 w 397411"/>
-              <a:gd name="connsiteY3" fmla="*/ 615 h 240457"/>
-              <a:gd name="connsiteX4" fmla="*/ 3563 w 397411"/>
-              <a:gd name="connsiteY4" fmla="*/ 49333 h 240457"/>
-            </a:gdLst>
-            <a:ahLst/>
-            <a:cxnLst>
-              <a:cxn ang="0">
-                <a:pos x="connsiteX0" y="connsiteY0"/>
-              </a:cxn>
-              <a:cxn ang="0">
-                <a:pos x="connsiteX1" y="connsiteY1"/>
-              </a:cxn>
-              <a:cxn ang="0">
-                <a:pos x="connsiteX2" y="connsiteY2"/>
-              </a:cxn>
-              <a:cxn ang="0">
-                <a:pos x="connsiteX3" y="connsiteY3"/>
-              </a:cxn>
-              <a:cxn ang="0">
-                <a:pos x="connsiteX4" y="connsiteY4"/>
-              </a:cxn>
-            </a:cxnLst>
-            <a:rect l="l" t="t" r="r" b="b"/>
-            <a:pathLst>
-              <a:path w="397411" h="240457">
-                <a:moveTo>
-                  <a:pt x="243405" y="240457"/>
-                </a:moveTo>
-                <a:cubicBezTo>
-                  <a:pt x="301804" y="227653"/>
-                  <a:pt x="360203" y="214849"/>
-                  <a:pt x="382064" y="187992"/>
-                </a:cubicBezTo>
-                <a:cubicBezTo>
-                  <a:pt x="403925" y="161135"/>
-                  <a:pt x="403300" y="110542"/>
-                  <a:pt x="374569" y="79313"/>
-                </a:cubicBezTo>
-                <a:cubicBezTo>
-                  <a:pt x="345838" y="48083"/>
-                  <a:pt x="271512" y="5612"/>
-                  <a:pt x="209678" y="615"/>
-                </a:cubicBezTo>
-                <a:cubicBezTo>
-                  <a:pt x="147844" y="-4382"/>
-                  <a:pt x="-27042" y="21851"/>
-                  <a:pt x="3563" y="49333"/>
-                </a:cubicBezTo>
-              </a:path>
-            </a:pathLst>
-          </a:custGeom>
-          <a:noFill/>
-          <a:ln w="19050">
-            <a:solidFill>
-              <a:schemeClr val="tx1"/>
-            </a:solidFill>
-          </a:ln>
-        </p:spPr>
-        <p:style>
-          <a:lnRef idx="2">
-            <a:schemeClr val="accent1">
-              <a:shade val="50000"/>
-            </a:schemeClr>
-          </a:lnRef>
-          <a:fillRef idx="1">
-            <a:schemeClr val="accent1"/>
-          </a:fillRef>
-          <a:effectRef idx="0">
-            <a:schemeClr val="accent1"/>
-          </a:effectRef>
-          <a:fontRef idx="minor">
-            <a:schemeClr val="lt1"/>
-          </a:fontRef>
-        </p:style>
-        <p:txBody>
-          <a:bodyPr rtlCol="0" anchor="ctr"/>
-          <a:lstStyle/>
-          <a:p>
-            <a:pPr algn="ctr"/>
-            <a:endParaRPr lang="en-GB"/>
-          </a:p>
-        </p:txBody>
-      </p:sp>
-      <p:sp>
-        <p:nvSpPr>
-          <p:cNvPr id="99" name="Freeform 98">
-            <a:extLst>
-              <a:ext uri="{FF2B5EF4-FFF2-40B4-BE49-F238E27FC236}">
-                <a16:creationId xmlns:a16="http://schemas.microsoft.com/office/drawing/2014/main" id="{23452CBB-E6B2-C948-BD34-D9B627254BC7}"/>
-              </a:ext>
-            </a:extLst>
-          </p:cNvPr>
-          <p:cNvSpPr/>
-          <p:nvPr/>
-        </p:nvSpPr>
-        <p:spPr>
-          <a:xfrm rot="10800000">
-            <a:off x="3386197" y="3334573"/>
-            <a:ext cx="397411" cy="240457"/>
-          </a:xfrm>
-          <a:custGeom>
-            <a:avLst/>
-            <a:gdLst>
-              <a:gd name="connsiteX0" fmla="*/ 243405 w 397411"/>
-              <a:gd name="connsiteY0" fmla="*/ 240457 h 240457"/>
-              <a:gd name="connsiteX1" fmla="*/ 382064 w 397411"/>
-              <a:gd name="connsiteY1" fmla="*/ 187992 h 240457"/>
-              <a:gd name="connsiteX2" fmla="*/ 374569 w 397411"/>
-              <a:gd name="connsiteY2" fmla="*/ 79313 h 240457"/>
-              <a:gd name="connsiteX3" fmla="*/ 209678 w 397411"/>
-              <a:gd name="connsiteY3" fmla="*/ 615 h 240457"/>
-              <a:gd name="connsiteX4" fmla="*/ 3563 w 397411"/>
-              <a:gd name="connsiteY4" fmla="*/ 49333 h 240457"/>
-            </a:gdLst>
-            <a:ahLst/>
-            <a:cxnLst>
-              <a:cxn ang="0">
-                <a:pos x="connsiteX0" y="connsiteY0"/>
-              </a:cxn>
-              <a:cxn ang="0">
-                <a:pos x="connsiteX1" y="connsiteY1"/>
-              </a:cxn>
-              <a:cxn ang="0">
-                <a:pos x="connsiteX2" y="connsiteY2"/>
-              </a:cxn>
-              <a:cxn ang="0">
-                <a:pos x="connsiteX3" y="connsiteY3"/>
-              </a:cxn>
-              <a:cxn ang="0">
-                <a:pos x="connsiteX4" y="connsiteY4"/>
-              </a:cxn>
-            </a:cxnLst>
-            <a:rect l="l" t="t" r="r" b="b"/>
-            <a:pathLst>
-              <a:path w="397411" h="240457">
-                <a:moveTo>
-                  <a:pt x="243405" y="240457"/>
-                </a:moveTo>
-                <a:cubicBezTo>
-                  <a:pt x="301804" y="227653"/>
-                  <a:pt x="360203" y="214849"/>
-                  <a:pt x="382064" y="187992"/>
-                </a:cubicBezTo>
-                <a:cubicBezTo>
-                  <a:pt x="403925" y="161135"/>
-                  <a:pt x="403300" y="110542"/>
-                  <a:pt x="374569" y="79313"/>
-                </a:cubicBezTo>
-                <a:cubicBezTo>
-                  <a:pt x="345838" y="48083"/>
-                  <a:pt x="271512" y="5612"/>
-                  <a:pt x="209678" y="615"/>
-                </a:cubicBezTo>
-                <a:cubicBezTo>
-                  <a:pt x="147844" y="-4382"/>
-                  <a:pt x="-27042" y="21851"/>
-                  <a:pt x="3563" y="49333"/>
-                </a:cubicBezTo>
-              </a:path>
-            </a:pathLst>
-          </a:custGeom>
-          <a:noFill/>
-          <a:ln w="19050">
-            <a:solidFill>
-              <a:schemeClr val="tx1"/>
-            </a:solidFill>
-          </a:ln>
-        </p:spPr>
-        <p:style>
-          <a:lnRef idx="2">
-            <a:schemeClr val="accent1">
-              <a:shade val="50000"/>
-            </a:schemeClr>
-          </a:lnRef>
-          <a:fillRef idx="1">
-            <a:schemeClr val="accent1"/>
-          </a:fillRef>
-          <a:effectRef idx="0">
-            <a:schemeClr val="accent1"/>
-          </a:effectRef>
-          <a:fontRef idx="minor">
-            <a:schemeClr val="lt1"/>
-          </a:fontRef>
-        </p:style>
-        <p:txBody>
-          <a:bodyPr rtlCol="0" anchor="ctr"/>
-          <a:lstStyle/>
-          <a:p>
-            <a:pPr algn="ctr"/>
-            <a:endParaRPr lang="en-GB"/>
-          </a:p>
-        </p:txBody>
-      </p:sp>
-      <p:sp>
-        <p:nvSpPr>
-          <p:cNvPr id="100" name="Oval 99">
-            <a:extLst>
-              <a:ext uri="{FF2B5EF4-FFF2-40B4-BE49-F238E27FC236}">
-                <a16:creationId xmlns:a16="http://schemas.microsoft.com/office/drawing/2014/main" id="{FD548128-C7A2-714F-9AEA-67AC4A9EFFCA}"/>
-              </a:ext>
-            </a:extLst>
-          </p:cNvPr>
-          <p:cNvSpPr/>
-          <p:nvPr/>
-        </p:nvSpPr>
-        <p:spPr>
-          <a:xfrm>
-            <a:off x="107790" y="3336447"/>
-            <a:ext cx="248856" cy="150351"/>
-          </a:xfrm>
-          <a:prstGeom prst="ellipse">
-            <a:avLst/>
-          </a:prstGeom>
-          <a:noFill/>
-          <a:ln w="19050">
-            <a:solidFill>
-              <a:schemeClr val="tx1"/>
-            </a:solidFill>
-          </a:ln>
-        </p:spPr>
-        <p:style>
-          <a:lnRef idx="2">
-            <a:schemeClr val="accent1">
-              <a:shade val="50000"/>
-            </a:schemeClr>
-          </a:lnRef>
-          <a:fillRef idx="1">
-            <a:schemeClr val="accent1"/>
-          </a:fillRef>
-          <a:effectRef idx="0">
-            <a:schemeClr val="accent1"/>
-          </a:effectRef>
-          <a:fontRef idx="minor">
-            <a:schemeClr val="lt1"/>
-          </a:fontRef>
-        </p:style>
-        <p:txBody>
-          <a:bodyPr rtlCol="0" anchor="ctr"/>
-          <a:lstStyle/>
-          <a:p>
-            <a:pPr algn="ctr"/>
-            <a:endParaRPr lang="en-GB"/>
-          </a:p>
-        </p:txBody>
-      </p:sp>
-      <p:sp>
-        <p:nvSpPr>
-          <p:cNvPr id="101" name="Freeform 100">
-            <a:extLst>
-              <a:ext uri="{FF2B5EF4-FFF2-40B4-BE49-F238E27FC236}">
-                <a16:creationId xmlns:a16="http://schemas.microsoft.com/office/drawing/2014/main" id="{02CBBB45-471C-4D45-ABF5-DDFF2497277B}"/>
-              </a:ext>
-            </a:extLst>
-          </p:cNvPr>
-          <p:cNvSpPr/>
-          <p:nvPr/>
-        </p:nvSpPr>
-        <p:spPr>
-          <a:xfrm>
-            <a:off x="0" y="3246341"/>
-            <a:ext cx="397411" cy="240457"/>
-          </a:xfrm>
-          <a:custGeom>
-            <a:avLst/>
-            <a:gdLst>
-              <a:gd name="connsiteX0" fmla="*/ 243405 w 397411"/>
-              <a:gd name="connsiteY0" fmla="*/ 240457 h 240457"/>
-              <a:gd name="connsiteX1" fmla="*/ 382064 w 397411"/>
-              <a:gd name="connsiteY1" fmla="*/ 187992 h 240457"/>
-              <a:gd name="connsiteX2" fmla="*/ 374569 w 397411"/>
-              <a:gd name="connsiteY2" fmla="*/ 79313 h 240457"/>
-              <a:gd name="connsiteX3" fmla="*/ 209678 w 397411"/>
-              <a:gd name="connsiteY3" fmla="*/ 615 h 240457"/>
-              <a:gd name="connsiteX4" fmla="*/ 3563 w 397411"/>
-              <a:gd name="connsiteY4" fmla="*/ 49333 h 240457"/>
-            </a:gdLst>
-            <a:ahLst/>
-            <a:cxnLst>
-              <a:cxn ang="0">
-                <a:pos x="connsiteX0" y="connsiteY0"/>
-              </a:cxn>
-              <a:cxn ang="0">
-                <a:pos x="connsiteX1" y="connsiteY1"/>
-              </a:cxn>
-              <a:cxn ang="0">
-                <a:pos x="connsiteX2" y="connsiteY2"/>
-              </a:cxn>
-              <a:cxn ang="0">
-                <a:pos x="connsiteX3" y="connsiteY3"/>
-              </a:cxn>
-              <a:cxn ang="0">
-                <a:pos x="connsiteX4" y="connsiteY4"/>
-              </a:cxn>
-            </a:cxnLst>
-            <a:rect l="l" t="t" r="r" b="b"/>
-            <a:pathLst>
-              <a:path w="397411" h="240457">
-                <a:moveTo>
-                  <a:pt x="243405" y="240457"/>
-                </a:moveTo>
-                <a:cubicBezTo>
-                  <a:pt x="301804" y="227653"/>
-                  <a:pt x="360203" y="214849"/>
-                  <a:pt x="382064" y="187992"/>
-                </a:cubicBezTo>
-                <a:cubicBezTo>
-                  <a:pt x="403925" y="161135"/>
-                  <a:pt x="403300" y="110542"/>
-                  <a:pt x="374569" y="79313"/>
-                </a:cubicBezTo>
-                <a:cubicBezTo>
-                  <a:pt x="345838" y="48083"/>
-                  <a:pt x="271512" y="5612"/>
-                  <a:pt x="209678" y="615"/>
-                </a:cubicBezTo>
-                <a:cubicBezTo>
-                  <a:pt x="147844" y="-4382"/>
-                  <a:pt x="-27042" y="21851"/>
-                  <a:pt x="3563" y="49333"/>
-                </a:cubicBezTo>
-              </a:path>
-            </a:pathLst>
-          </a:custGeom>
-          <a:noFill/>
-          <a:ln w="19050">
-            <a:solidFill>
-              <a:schemeClr val="tx1"/>
-            </a:solidFill>
-          </a:ln>
-        </p:spPr>
-        <p:style>
-          <a:lnRef idx="2">
-            <a:schemeClr val="accent1">
-              <a:shade val="50000"/>
-            </a:schemeClr>
-          </a:lnRef>
-          <a:fillRef idx="1">
-            <a:schemeClr val="accent1"/>
-          </a:fillRef>
-          <a:effectRef idx="0">
-            <a:schemeClr val="accent1"/>
-          </a:effectRef>
-          <a:fontRef idx="minor">
-            <a:schemeClr val="lt1"/>
-          </a:fontRef>
-        </p:style>
-        <p:txBody>
-          <a:bodyPr rtlCol="0" anchor="ctr"/>
-          <a:lstStyle/>
-          <a:p>
-            <a:pPr algn="ctr"/>
-            <a:endParaRPr lang="en-GB"/>
-          </a:p>
-        </p:txBody>
-      </p:sp>
-      <p:sp>
-        <p:nvSpPr>
-          <p:cNvPr id="102" name="Freeform 101">
-            <a:extLst>
-              <a:ext uri="{FF2B5EF4-FFF2-40B4-BE49-F238E27FC236}">
-                <a16:creationId xmlns:a16="http://schemas.microsoft.com/office/drawing/2014/main" id="{C1ACA648-997C-354A-9875-844C6A8E71CB}"/>
-              </a:ext>
-            </a:extLst>
-          </p:cNvPr>
-          <p:cNvSpPr/>
-          <p:nvPr/>
-        </p:nvSpPr>
-        <p:spPr>
-          <a:xfrm rot="10800000">
-            <a:off x="67021" y="3334573"/>
-            <a:ext cx="397411" cy="240457"/>
-          </a:xfrm>
-          <a:custGeom>
-            <a:avLst/>
-            <a:gdLst>
-              <a:gd name="connsiteX0" fmla="*/ 243405 w 397411"/>
-              <a:gd name="connsiteY0" fmla="*/ 240457 h 240457"/>
-              <a:gd name="connsiteX1" fmla="*/ 382064 w 397411"/>
-              <a:gd name="connsiteY1" fmla="*/ 187992 h 240457"/>
-              <a:gd name="connsiteX2" fmla="*/ 374569 w 397411"/>
-              <a:gd name="connsiteY2" fmla="*/ 79313 h 240457"/>
-              <a:gd name="connsiteX3" fmla="*/ 209678 w 397411"/>
-              <a:gd name="connsiteY3" fmla="*/ 615 h 240457"/>
-              <a:gd name="connsiteX4" fmla="*/ 3563 w 397411"/>
-              <a:gd name="connsiteY4" fmla="*/ 49333 h 240457"/>
-            </a:gdLst>
-            <a:ahLst/>
-            <a:cxnLst>
-              <a:cxn ang="0">
-                <a:pos x="connsiteX0" y="connsiteY0"/>
-              </a:cxn>
-              <a:cxn ang="0">
-                <a:pos x="connsiteX1" y="connsiteY1"/>
-              </a:cxn>
-              <a:cxn ang="0">
-                <a:pos x="connsiteX2" y="connsiteY2"/>
-              </a:cxn>
-              <a:cxn ang="0">
-                <a:pos x="connsiteX3" y="connsiteY3"/>
-              </a:cxn>
-              <a:cxn ang="0">
-                <a:pos x="connsiteX4" y="connsiteY4"/>
-              </a:cxn>
-            </a:cxnLst>
-            <a:rect l="l" t="t" r="r" b="b"/>
-            <a:pathLst>
-              <a:path w="397411" h="240457">
-                <a:moveTo>
-                  <a:pt x="243405" y="240457"/>
-                </a:moveTo>
-                <a:cubicBezTo>
-                  <a:pt x="301804" y="227653"/>
-                  <a:pt x="360203" y="214849"/>
-                  <a:pt x="382064" y="187992"/>
-                </a:cubicBezTo>
-                <a:cubicBezTo>
-                  <a:pt x="403925" y="161135"/>
-                  <a:pt x="403300" y="110542"/>
-                  <a:pt x="374569" y="79313"/>
-                </a:cubicBezTo>
-                <a:cubicBezTo>
-                  <a:pt x="345838" y="48083"/>
-                  <a:pt x="271512" y="5612"/>
-                  <a:pt x="209678" y="615"/>
-                </a:cubicBezTo>
-                <a:cubicBezTo>
-                  <a:pt x="147844" y="-4382"/>
-                  <a:pt x="-27042" y="21851"/>
-                  <a:pt x="3563" y="49333"/>
-                </a:cubicBezTo>
-              </a:path>
-            </a:pathLst>
-          </a:custGeom>
-          <a:noFill/>
-          <a:ln w="19050">
-            <a:solidFill>
-              <a:schemeClr val="tx1"/>
-            </a:solidFill>
-          </a:ln>
-        </p:spPr>
-        <p:style>
-          <a:lnRef idx="2">
-            <a:schemeClr val="accent1">
-              <a:shade val="50000"/>
-            </a:schemeClr>
-          </a:lnRef>
-          <a:fillRef idx="1">
-            <a:schemeClr val="accent1"/>
-          </a:fillRef>
-          <a:effectRef idx="0">
-            <a:schemeClr val="accent1"/>
-          </a:effectRef>
-          <a:fontRef idx="minor">
-            <a:schemeClr val="lt1"/>
-          </a:fontRef>
-        </p:style>
-        <p:txBody>
-          <a:bodyPr rtlCol="0" anchor="ctr"/>
-          <a:lstStyle/>
-          <a:p>
-            <a:pPr algn="ctr"/>
-            <a:endParaRPr lang="en-GB"/>
-          </a:p>
-        </p:txBody>
-      </p:sp>
+        </p:grpSpPr>
+        <p:sp>
+          <p:nvSpPr>
+            <p:cNvPr id="97" name="Oval 96">
+              <a:extLst>
+                <a:ext uri="{FF2B5EF4-FFF2-40B4-BE49-F238E27FC236}">
+                  <a16:creationId xmlns:a16="http://schemas.microsoft.com/office/drawing/2014/main" id="{5079A29C-D964-AC4C-BCD6-8DEB56D97433}"/>
+                </a:ext>
+              </a:extLst>
+            </p:cNvPr>
+            <p:cNvSpPr/>
+            <p:nvPr/>
+          </p:nvSpPr>
+          <p:spPr>
+            <a:xfrm>
+              <a:off x="3426966" y="3336447"/>
+              <a:ext cx="248856" cy="150351"/>
+            </a:xfrm>
+            <a:prstGeom prst="ellipse">
+              <a:avLst/>
+            </a:prstGeom>
+            <a:noFill/>
+            <a:ln w="25400">
+              <a:solidFill>
+                <a:schemeClr val="accent2"/>
+              </a:solidFill>
+            </a:ln>
+          </p:spPr>
+          <p:style>
+            <a:lnRef idx="2">
+              <a:schemeClr val="accent1">
+                <a:shade val="50000"/>
+              </a:schemeClr>
+            </a:lnRef>
+            <a:fillRef idx="1">
+              <a:schemeClr val="accent1"/>
+            </a:fillRef>
+            <a:effectRef idx="0">
+              <a:schemeClr val="accent1"/>
+            </a:effectRef>
+            <a:fontRef idx="minor">
+              <a:schemeClr val="lt1"/>
+            </a:fontRef>
+          </p:style>
+          <p:txBody>
+            <a:bodyPr rtlCol="0" anchor="ctr"/>
+            <a:lstStyle/>
+            <a:p>
+              <a:pPr algn="ctr"/>
+              <a:endParaRPr lang="en-GB"/>
+            </a:p>
+          </p:txBody>
+        </p:sp>
+        <p:sp>
+          <p:nvSpPr>
+            <p:cNvPr id="98" name="Freeform 97">
+              <a:extLst>
+                <a:ext uri="{FF2B5EF4-FFF2-40B4-BE49-F238E27FC236}">
+                  <a16:creationId xmlns:a16="http://schemas.microsoft.com/office/drawing/2014/main" id="{457A0056-2FBE-1C4C-B333-D640D241E5E8}"/>
+                </a:ext>
+              </a:extLst>
+            </p:cNvPr>
+            <p:cNvSpPr/>
+            <p:nvPr/>
+          </p:nvSpPr>
+          <p:spPr>
+            <a:xfrm>
+              <a:off x="3329061" y="3246341"/>
+              <a:ext cx="397411" cy="240457"/>
+            </a:xfrm>
+            <a:custGeom>
+              <a:avLst/>
+              <a:gdLst>
+                <a:gd name="connsiteX0" fmla="*/ 243405 w 397411"/>
+                <a:gd name="connsiteY0" fmla="*/ 240457 h 240457"/>
+                <a:gd name="connsiteX1" fmla="*/ 382064 w 397411"/>
+                <a:gd name="connsiteY1" fmla="*/ 187992 h 240457"/>
+                <a:gd name="connsiteX2" fmla="*/ 374569 w 397411"/>
+                <a:gd name="connsiteY2" fmla="*/ 79313 h 240457"/>
+                <a:gd name="connsiteX3" fmla="*/ 209678 w 397411"/>
+                <a:gd name="connsiteY3" fmla="*/ 615 h 240457"/>
+                <a:gd name="connsiteX4" fmla="*/ 3563 w 397411"/>
+                <a:gd name="connsiteY4" fmla="*/ 49333 h 240457"/>
+              </a:gdLst>
+              <a:ahLst/>
+              <a:cxnLst>
+                <a:cxn ang="0">
+                  <a:pos x="connsiteX0" y="connsiteY0"/>
+                </a:cxn>
+                <a:cxn ang="0">
+                  <a:pos x="connsiteX1" y="connsiteY1"/>
+                </a:cxn>
+                <a:cxn ang="0">
+                  <a:pos x="connsiteX2" y="connsiteY2"/>
+                </a:cxn>
+                <a:cxn ang="0">
+                  <a:pos x="connsiteX3" y="connsiteY3"/>
+                </a:cxn>
+                <a:cxn ang="0">
+                  <a:pos x="connsiteX4" y="connsiteY4"/>
+                </a:cxn>
+              </a:cxnLst>
+              <a:rect l="l" t="t" r="r" b="b"/>
+              <a:pathLst>
+                <a:path w="397411" h="240457">
+                  <a:moveTo>
+                    <a:pt x="243405" y="240457"/>
+                  </a:moveTo>
+                  <a:cubicBezTo>
+                    <a:pt x="301804" y="227653"/>
+                    <a:pt x="360203" y="214849"/>
+                    <a:pt x="382064" y="187992"/>
+                  </a:cubicBezTo>
+                  <a:cubicBezTo>
+                    <a:pt x="403925" y="161135"/>
+                    <a:pt x="403300" y="110542"/>
+                    <a:pt x="374569" y="79313"/>
+                  </a:cubicBezTo>
+                  <a:cubicBezTo>
+                    <a:pt x="345838" y="48083"/>
+                    <a:pt x="271512" y="5612"/>
+                    <a:pt x="209678" y="615"/>
+                  </a:cubicBezTo>
+                  <a:cubicBezTo>
+                    <a:pt x="147844" y="-4382"/>
+                    <a:pt x="-27042" y="21851"/>
+                    <a:pt x="3563" y="49333"/>
+                  </a:cubicBezTo>
+                </a:path>
+              </a:pathLst>
+            </a:custGeom>
+            <a:noFill/>
+            <a:ln w="25400">
+              <a:solidFill>
+                <a:schemeClr val="accent2"/>
+              </a:solidFill>
+            </a:ln>
+          </p:spPr>
+          <p:style>
+            <a:lnRef idx="2">
+              <a:schemeClr val="accent1">
+                <a:shade val="50000"/>
+              </a:schemeClr>
+            </a:lnRef>
+            <a:fillRef idx="1">
+              <a:schemeClr val="accent1"/>
+            </a:fillRef>
+            <a:effectRef idx="0">
+              <a:schemeClr val="accent1"/>
+            </a:effectRef>
+            <a:fontRef idx="minor">
+              <a:schemeClr val="lt1"/>
+            </a:fontRef>
+          </p:style>
+          <p:txBody>
+            <a:bodyPr rtlCol="0" anchor="ctr"/>
+            <a:lstStyle/>
+            <a:p>
+              <a:pPr algn="ctr"/>
+              <a:endParaRPr lang="en-GB"/>
+            </a:p>
+          </p:txBody>
+        </p:sp>
+        <p:sp>
+          <p:nvSpPr>
+            <p:cNvPr id="99" name="Freeform 98">
+              <a:extLst>
+                <a:ext uri="{FF2B5EF4-FFF2-40B4-BE49-F238E27FC236}">
+                  <a16:creationId xmlns:a16="http://schemas.microsoft.com/office/drawing/2014/main" id="{23452CBB-E6B2-C948-BD34-D9B627254BC7}"/>
+                </a:ext>
+              </a:extLst>
+            </p:cNvPr>
+            <p:cNvSpPr/>
+            <p:nvPr/>
+          </p:nvSpPr>
+          <p:spPr>
+            <a:xfrm rot="10800000">
+              <a:off x="3396082" y="3334573"/>
+              <a:ext cx="397411" cy="240457"/>
+            </a:xfrm>
+            <a:custGeom>
+              <a:avLst/>
+              <a:gdLst>
+                <a:gd name="connsiteX0" fmla="*/ 243405 w 397411"/>
+                <a:gd name="connsiteY0" fmla="*/ 240457 h 240457"/>
+                <a:gd name="connsiteX1" fmla="*/ 382064 w 397411"/>
+                <a:gd name="connsiteY1" fmla="*/ 187992 h 240457"/>
+                <a:gd name="connsiteX2" fmla="*/ 374569 w 397411"/>
+                <a:gd name="connsiteY2" fmla="*/ 79313 h 240457"/>
+                <a:gd name="connsiteX3" fmla="*/ 209678 w 397411"/>
+                <a:gd name="connsiteY3" fmla="*/ 615 h 240457"/>
+                <a:gd name="connsiteX4" fmla="*/ 3563 w 397411"/>
+                <a:gd name="connsiteY4" fmla="*/ 49333 h 240457"/>
+              </a:gdLst>
+              <a:ahLst/>
+              <a:cxnLst>
+                <a:cxn ang="0">
+                  <a:pos x="connsiteX0" y="connsiteY0"/>
+                </a:cxn>
+                <a:cxn ang="0">
+                  <a:pos x="connsiteX1" y="connsiteY1"/>
+                </a:cxn>
+                <a:cxn ang="0">
+                  <a:pos x="connsiteX2" y="connsiteY2"/>
+                </a:cxn>
+                <a:cxn ang="0">
+                  <a:pos x="connsiteX3" y="connsiteY3"/>
+                </a:cxn>
+                <a:cxn ang="0">
+                  <a:pos x="connsiteX4" y="connsiteY4"/>
+                </a:cxn>
+              </a:cxnLst>
+              <a:rect l="l" t="t" r="r" b="b"/>
+              <a:pathLst>
+                <a:path w="397411" h="240457">
+                  <a:moveTo>
+                    <a:pt x="243405" y="240457"/>
+                  </a:moveTo>
+                  <a:cubicBezTo>
+                    <a:pt x="301804" y="227653"/>
+                    <a:pt x="360203" y="214849"/>
+                    <a:pt x="382064" y="187992"/>
+                  </a:cubicBezTo>
+                  <a:cubicBezTo>
+                    <a:pt x="403925" y="161135"/>
+                    <a:pt x="403300" y="110542"/>
+                    <a:pt x="374569" y="79313"/>
+                  </a:cubicBezTo>
+                  <a:cubicBezTo>
+                    <a:pt x="345838" y="48083"/>
+                    <a:pt x="271512" y="5612"/>
+                    <a:pt x="209678" y="615"/>
+                  </a:cubicBezTo>
+                  <a:cubicBezTo>
+                    <a:pt x="147844" y="-4382"/>
+                    <a:pt x="-27042" y="21851"/>
+                    <a:pt x="3563" y="49333"/>
+                  </a:cubicBezTo>
+                </a:path>
+              </a:pathLst>
+            </a:custGeom>
+            <a:noFill/>
+            <a:ln w="25400">
+              <a:solidFill>
+                <a:schemeClr val="accent2"/>
+              </a:solidFill>
+            </a:ln>
+          </p:spPr>
+          <p:style>
+            <a:lnRef idx="2">
+              <a:schemeClr val="accent1">
+                <a:shade val="50000"/>
+              </a:schemeClr>
+            </a:lnRef>
+            <a:fillRef idx="1">
+              <a:schemeClr val="accent1"/>
+            </a:fillRef>
+            <a:effectRef idx="0">
+              <a:schemeClr val="accent1"/>
+            </a:effectRef>
+            <a:fontRef idx="minor">
+              <a:schemeClr val="lt1"/>
+            </a:fontRef>
+          </p:style>
+          <p:txBody>
+            <a:bodyPr rtlCol="0" anchor="ctr"/>
+            <a:lstStyle/>
+            <a:p>
+              <a:pPr algn="ctr"/>
+              <a:endParaRPr lang="en-GB"/>
+            </a:p>
+          </p:txBody>
+        </p:sp>
+      </p:grpSp>
       <p:sp>
         <p:nvSpPr>
           <p:cNvPr id="103" name="TextBox 102">
@@ -5658,278 +4605,6 @@
               <a:rPr lang="en-GB" sz="2800" dirty="0"/>
               <a:t>D</a:t>
             </a:r>
-          </a:p>
-        </p:txBody>
-      </p:sp>
-      <p:sp>
-        <p:nvSpPr>
-          <p:cNvPr id="118" name="Oval 117">
-            <a:extLst>
-              <a:ext uri="{FF2B5EF4-FFF2-40B4-BE49-F238E27FC236}">
-                <a16:creationId xmlns:a16="http://schemas.microsoft.com/office/drawing/2014/main" id="{FC7C35F0-B09F-204B-9D3A-57D60B74E99B}"/>
-              </a:ext>
-            </a:extLst>
-          </p:cNvPr>
-          <p:cNvSpPr/>
-          <p:nvPr/>
-        </p:nvSpPr>
-        <p:spPr>
-          <a:xfrm>
-            <a:off x="1764189" y="3348900"/>
-            <a:ext cx="248856" cy="150351"/>
-          </a:xfrm>
-          <a:prstGeom prst="ellipse">
-            <a:avLst/>
-          </a:prstGeom>
-          <a:noFill/>
-          <a:ln w="19050">
-            <a:solidFill>
-              <a:schemeClr val="tx1"/>
-            </a:solidFill>
-          </a:ln>
-        </p:spPr>
-        <p:style>
-          <a:lnRef idx="2">
-            <a:schemeClr val="accent1">
-              <a:shade val="50000"/>
-            </a:schemeClr>
-          </a:lnRef>
-          <a:fillRef idx="1">
-            <a:schemeClr val="accent1"/>
-          </a:fillRef>
-          <a:effectRef idx="0">
-            <a:schemeClr val="accent1"/>
-          </a:effectRef>
-          <a:fontRef idx="minor">
-            <a:schemeClr val="lt1"/>
-          </a:fontRef>
-        </p:style>
-        <p:txBody>
-          <a:bodyPr rtlCol="0" anchor="ctr"/>
-          <a:lstStyle/>
-          <a:p>
-            <a:pPr algn="ctr"/>
-            <a:endParaRPr lang="en-GB"/>
-          </a:p>
-        </p:txBody>
-      </p:sp>
-      <p:sp>
-        <p:nvSpPr>
-          <p:cNvPr id="119" name="Freeform 118">
-            <a:extLst>
-              <a:ext uri="{FF2B5EF4-FFF2-40B4-BE49-F238E27FC236}">
-                <a16:creationId xmlns:a16="http://schemas.microsoft.com/office/drawing/2014/main" id="{CBD2CB7B-9678-3344-89F0-6C3347423F3C}"/>
-              </a:ext>
-            </a:extLst>
-          </p:cNvPr>
-          <p:cNvSpPr/>
-          <p:nvPr/>
-        </p:nvSpPr>
-        <p:spPr>
-          <a:xfrm>
-            <a:off x="1656399" y="3258794"/>
-            <a:ext cx="397411" cy="240457"/>
-          </a:xfrm>
-          <a:custGeom>
-            <a:avLst/>
-            <a:gdLst>
-              <a:gd name="connsiteX0" fmla="*/ 243405 w 397411"/>
-              <a:gd name="connsiteY0" fmla="*/ 240457 h 240457"/>
-              <a:gd name="connsiteX1" fmla="*/ 382064 w 397411"/>
-              <a:gd name="connsiteY1" fmla="*/ 187992 h 240457"/>
-              <a:gd name="connsiteX2" fmla="*/ 374569 w 397411"/>
-              <a:gd name="connsiteY2" fmla="*/ 79313 h 240457"/>
-              <a:gd name="connsiteX3" fmla="*/ 209678 w 397411"/>
-              <a:gd name="connsiteY3" fmla="*/ 615 h 240457"/>
-              <a:gd name="connsiteX4" fmla="*/ 3563 w 397411"/>
-              <a:gd name="connsiteY4" fmla="*/ 49333 h 240457"/>
-            </a:gdLst>
-            <a:ahLst/>
-            <a:cxnLst>
-              <a:cxn ang="0">
-                <a:pos x="connsiteX0" y="connsiteY0"/>
-              </a:cxn>
-              <a:cxn ang="0">
-                <a:pos x="connsiteX1" y="connsiteY1"/>
-              </a:cxn>
-              <a:cxn ang="0">
-                <a:pos x="connsiteX2" y="connsiteY2"/>
-              </a:cxn>
-              <a:cxn ang="0">
-                <a:pos x="connsiteX3" y="connsiteY3"/>
-              </a:cxn>
-              <a:cxn ang="0">
-                <a:pos x="connsiteX4" y="connsiteY4"/>
-              </a:cxn>
-            </a:cxnLst>
-            <a:rect l="l" t="t" r="r" b="b"/>
-            <a:pathLst>
-              <a:path w="397411" h="240457">
-                <a:moveTo>
-                  <a:pt x="243405" y="240457"/>
-                </a:moveTo>
-                <a:cubicBezTo>
-                  <a:pt x="301804" y="227653"/>
-                  <a:pt x="360203" y="214849"/>
-                  <a:pt x="382064" y="187992"/>
-                </a:cubicBezTo>
-                <a:cubicBezTo>
-                  <a:pt x="403925" y="161135"/>
-                  <a:pt x="403300" y="110542"/>
-                  <a:pt x="374569" y="79313"/>
-                </a:cubicBezTo>
-                <a:cubicBezTo>
-                  <a:pt x="345838" y="48083"/>
-                  <a:pt x="271512" y="5612"/>
-                  <a:pt x="209678" y="615"/>
-                </a:cubicBezTo>
-                <a:cubicBezTo>
-                  <a:pt x="147844" y="-4382"/>
-                  <a:pt x="-27042" y="21851"/>
-                  <a:pt x="3563" y="49333"/>
-                </a:cubicBezTo>
-              </a:path>
-            </a:pathLst>
-          </a:custGeom>
-          <a:noFill/>
-          <a:ln w="19050">
-            <a:solidFill>
-              <a:schemeClr val="tx1"/>
-            </a:solidFill>
-          </a:ln>
-        </p:spPr>
-        <p:style>
-          <a:lnRef idx="2">
-            <a:schemeClr val="accent1">
-              <a:shade val="50000"/>
-            </a:schemeClr>
-          </a:lnRef>
-          <a:fillRef idx="1">
-            <a:schemeClr val="accent1"/>
-          </a:fillRef>
-          <a:effectRef idx="0">
-            <a:schemeClr val="accent1"/>
-          </a:effectRef>
-          <a:fontRef idx="minor">
-            <a:schemeClr val="lt1"/>
-          </a:fontRef>
-        </p:style>
-        <p:txBody>
-          <a:bodyPr rtlCol="0" anchor="ctr"/>
-          <a:lstStyle/>
-          <a:p>
-            <a:pPr algn="ctr"/>
-            <a:endParaRPr lang="en-GB"/>
-          </a:p>
-        </p:txBody>
-      </p:sp>
-      <p:sp>
-        <p:nvSpPr>
-          <p:cNvPr id="120" name="Freeform 119">
-            <a:extLst>
-              <a:ext uri="{FF2B5EF4-FFF2-40B4-BE49-F238E27FC236}">
-                <a16:creationId xmlns:a16="http://schemas.microsoft.com/office/drawing/2014/main" id="{31A06633-DD5A-B143-A924-C661B96C1C76}"/>
-              </a:ext>
-            </a:extLst>
-          </p:cNvPr>
-          <p:cNvSpPr/>
-          <p:nvPr/>
-        </p:nvSpPr>
-        <p:spPr>
-          <a:xfrm rot="10800000">
-            <a:off x="1723420" y="3347026"/>
-            <a:ext cx="397411" cy="240457"/>
-          </a:xfrm>
-          <a:custGeom>
-            <a:avLst/>
-            <a:gdLst>
-              <a:gd name="connsiteX0" fmla="*/ 243405 w 397411"/>
-              <a:gd name="connsiteY0" fmla="*/ 240457 h 240457"/>
-              <a:gd name="connsiteX1" fmla="*/ 382064 w 397411"/>
-              <a:gd name="connsiteY1" fmla="*/ 187992 h 240457"/>
-              <a:gd name="connsiteX2" fmla="*/ 374569 w 397411"/>
-              <a:gd name="connsiteY2" fmla="*/ 79313 h 240457"/>
-              <a:gd name="connsiteX3" fmla="*/ 209678 w 397411"/>
-              <a:gd name="connsiteY3" fmla="*/ 615 h 240457"/>
-              <a:gd name="connsiteX4" fmla="*/ 3563 w 397411"/>
-              <a:gd name="connsiteY4" fmla="*/ 49333 h 240457"/>
-            </a:gdLst>
-            <a:ahLst/>
-            <a:cxnLst>
-              <a:cxn ang="0">
-                <a:pos x="connsiteX0" y="connsiteY0"/>
-              </a:cxn>
-              <a:cxn ang="0">
-                <a:pos x="connsiteX1" y="connsiteY1"/>
-              </a:cxn>
-              <a:cxn ang="0">
-                <a:pos x="connsiteX2" y="connsiteY2"/>
-              </a:cxn>
-              <a:cxn ang="0">
-                <a:pos x="connsiteX3" y="connsiteY3"/>
-              </a:cxn>
-              <a:cxn ang="0">
-                <a:pos x="connsiteX4" y="connsiteY4"/>
-              </a:cxn>
-            </a:cxnLst>
-            <a:rect l="l" t="t" r="r" b="b"/>
-            <a:pathLst>
-              <a:path w="397411" h="240457">
-                <a:moveTo>
-                  <a:pt x="243405" y="240457"/>
-                </a:moveTo>
-                <a:cubicBezTo>
-                  <a:pt x="301804" y="227653"/>
-                  <a:pt x="360203" y="214849"/>
-                  <a:pt x="382064" y="187992"/>
-                </a:cubicBezTo>
-                <a:cubicBezTo>
-                  <a:pt x="403925" y="161135"/>
-                  <a:pt x="403300" y="110542"/>
-                  <a:pt x="374569" y="79313"/>
-                </a:cubicBezTo>
-                <a:cubicBezTo>
-                  <a:pt x="345838" y="48083"/>
-                  <a:pt x="271512" y="5612"/>
-                  <a:pt x="209678" y="615"/>
-                </a:cubicBezTo>
-                <a:cubicBezTo>
-                  <a:pt x="147844" y="-4382"/>
-                  <a:pt x="-27042" y="21851"/>
-                  <a:pt x="3563" y="49333"/>
-                </a:cubicBezTo>
-              </a:path>
-            </a:pathLst>
-          </a:custGeom>
-          <a:noFill/>
-          <a:ln w="19050">
-            <a:solidFill>
-              <a:schemeClr val="tx1"/>
-            </a:solidFill>
-          </a:ln>
-        </p:spPr>
-        <p:style>
-          <a:lnRef idx="2">
-            <a:schemeClr val="accent1">
-              <a:shade val="50000"/>
-            </a:schemeClr>
-          </a:lnRef>
-          <a:fillRef idx="1">
-            <a:schemeClr val="accent1"/>
-          </a:fillRef>
-          <a:effectRef idx="0">
-            <a:schemeClr val="accent1"/>
-          </a:effectRef>
-          <a:fontRef idx="minor">
-            <a:schemeClr val="lt1"/>
-          </a:fontRef>
-        </p:style>
-        <p:txBody>
-          <a:bodyPr rtlCol="0" anchor="ctr"/>
-          <a:lstStyle/>
-          <a:p>
-            <a:pPr algn="ctr"/>
-            <a:endParaRPr lang="en-GB"/>
           </a:p>
         </p:txBody>
       </p:sp>
@@ -5977,6 +4652,1178 @@
           </a:fontRef>
         </p:style>
       </p:cxnSp>
+      <p:grpSp>
+        <p:nvGrpSpPr>
+          <p:cNvPr id="40" name="Group 39">
+            <a:extLst>
+              <a:ext uri="{FF2B5EF4-FFF2-40B4-BE49-F238E27FC236}">
+                <a16:creationId xmlns:a16="http://schemas.microsoft.com/office/drawing/2014/main" id="{0985C1B0-FD6A-7C4C-AE13-E2F78F1D4070}"/>
+              </a:ext>
+            </a:extLst>
+          </p:cNvPr>
+          <p:cNvGrpSpPr/>
+          <p:nvPr/>
+        </p:nvGrpSpPr>
+        <p:grpSpPr>
+          <a:xfrm>
+            <a:off x="3545" y="3249526"/>
+            <a:ext cx="464432" cy="328689"/>
+            <a:chOff x="3329061" y="3246341"/>
+            <a:chExt cx="464432" cy="328689"/>
+          </a:xfrm>
+        </p:grpSpPr>
+        <p:sp>
+          <p:nvSpPr>
+            <p:cNvPr id="41" name="Oval 40">
+              <a:extLst>
+                <a:ext uri="{FF2B5EF4-FFF2-40B4-BE49-F238E27FC236}">
+                  <a16:creationId xmlns:a16="http://schemas.microsoft.com/office/drawing/2014/main" id="{A499ED1C-C4A1-2745-89A7-8D9D302CD50C}"/>
+                </a:ext>
+              </a:extLst>
+            </p:cNvPr>
+            <p:cNvSpPr/>
+            <p:nvPr/>
+          </p:nvSpPr>
+          <p:spPr>
+            <a:xfrm>
+              <a:off x="3426966" y="3336447"/>
+              <a:ext cx="248856" cy="150351"/>
+            </a:xfrm>
+            <a:prstGeom prst="ellipse">
+              <a:avLst/>
+            </a:prstGeom>
+            <a:noFill/>
+            <a:ln w="25400">
+              <a:solidFill>
+                <a:schemeClr val="accent2"/>
+              </a:solidFill>
+            </a:ln>
+          </p:spPr>
+          <p:style>
+            <a:lnRef idx="2">
+              <a:schemeClr val="accent1">
+                <a:shade val="50000"/>
+              </a:schemeClr>
+            </a:lnRef>
+            <a:fillRef idx="1">
+              <a:schemeClr val="accent1"/>
+            </a:fillRef>
+            <a:effectRef idx="0">
+              <a:schemeClr val="accent1"/>
+            </a:effectRef>
+            <a:fontRef idx="minor">
+              <a:schemeClr val="lt1"/>
+            </a:fontRef>
+          </p:style>
+          <p:txBody>
+            <a:bodyPr rtlCol="0" anchor="ctr"/>
+            <a:lstStyle/>
+            <a:p>
+              <a:pPr algn="ctr"/>
+              <a:endParaRPr lang="en-GB"/>
+            </a:p>
+          </p:txBody>
+        </p:sp>
+        <p:sp>
+          <p:nvSpPr>
+            <p:cNvPr id="42" name="Freeform 41">
+              <a:extLst>
+                <a:ext uri="{FF2B5EF4-FFF2-40B4-BE49-F238E27FC236}">
+                  <a16:creationId xmlns:a16="http://schemas.microsoft.com/office/drawing/2014/main" id="{0E042C09-E659-5140-9317-DE2AF9E01692}"/>
+                </a:ext>
+              </a:extLst>
+            </p:cNvPr>
+            <p:cNvSpPr/>
+            <p:nvPr/>
+          </p:nvSpPr>
+          <p:spPr>
+            <a:xfrm>
+              <a:off x="3329061" y="3246341"/>
+              <a:ext cx="397411" cy="240457"/>
+            </a:xfrm>
+            <a:custGeom>
+              <a:avLst/>
+              <a:gdLst>
+                <a:gd name="connsiteX0" fmla="*/ 243405 w 397411"/>
+                <a:gd name="connsiteY0" fmla="*/ 240457 h 240457"/>
+                <a:gd name="connsiteX1" fmla="*/ 382064 w 397411"/>
+                <a:gd name="connsiteY1" fmla="*/ 187992 h 240457"/>
+                <a:gd name="connsiteX2" fmla="*/ 374569 w 397411"/>
+                <a:gd name="connsiteY2" fmla="*/ 79313 h 240457"/>
+                <a:gd name="connsiteX3" fmla="*/ 209678 w 397411"/>
+                <a:gd name="connsiteY3" fmla="*/ 615 h 240457"/>
+                <a:gd name="connsiteX4" fmla="*/ 3563 w 397411"/>
+                <a:gd name="connsiteY4" fmla="*/ 49333 h 240457"/>
+              </a:gdLst>
+              <a:ahLst/>
+              <a:cxnLst>
+                <a:cxn ang="0">
+                  <a:pos x="connsiteX0" y="connsiteY0"/>
+                </a:cxn>
+                <a:cxn ang="0">
+                  <a:pos x="connsiteX1" y="connsiteY1"/>
+                </a:cxn>
+                <a:cxn ang="0">
+                  <a:pos x="connsiteX2" y="connsiteY2"/>
+                </a:cxn>
+                <a:cxn ang="0">
+                  <a:pos x="connsiteX3" y="connsiteY3"/>
+                </a:cxn>
+                <a:cxn ang="0">
+                  <a:pos x="connsiteX4" y="connsiteY4"/>
+                </a:cxn>
+              </a:cxnLst>
+              <a:rect l="l" t="t" r="r" b="b"/>
+              <a:pathLst>
+                <a:path w="397411" h="240457">
+                  <a:moveTo>
+                    <a:pt x="243405" y="240457"/>
+                  </a:moveTo>
+                  <a:cubicBezTo>
+                    <a:pt x="301804" y="227653"/>
+                    <a:pt x="360203" y="214849"/>
+                    <a:pt x="382064" y="187992"/>
+                  </a:cubicBezTo>
+                  <a:cubicBezTo>
+                    <a:pt x="403925" y="161135"/>
+                    <a:pt x="403300" y="110542"/>
+                    <a:pt x="374569" y="79313"/>
+                  </a:cubicBezTo>
+                  <a:cubicBezTo>
+                    <a:pt x="345838" y="48083"/>
+                    <a:pt x="271512" y="5612"/>
+                    <a:pt x="209678" y="615"/>
+                  </a:cubicBezTo>
+                  <a:cubicBezTo>
+                    <a:pt x="147844" y="-4382"/>
+                    <a:pt x="-27042" y="21851"/>
+                    <a:pt x="3563" y="49333"/>
+                  </a:cubicBezTo>
+                </a:path>
+              </a:pathLst>
+            </a:custGeom>
+            <a:noFill/>
+            <a:ln w="25400">
+              <a:solidFill>
+                <a:schemeClr val="accent2"/>
+              </a:solidFill>
+            </a:ln>
+          </p:spPr>
+          <p:style>
+            <a:lnRef idx="2">
+              <a:schemeClr val="accent1">
+                <a:shade val="50000"/>
+              </a:schemeClr>
+            </a:lnRef>
+            <a:fillRef idx="1">
+              <a:schemeClr val="accent1"/>
+            </a:fillRef>
+            <a:effectRef idx="0">
+              <a:schemeClr val="accent1"/>
+            </a:effectRef>
+            <a:fontRef idx="minor">
+              <a:schemeClr val="lt1"/>
+            </a:fontRef>
+          </p:style>
+          <p:txBody>
+            <a:bodyPr rtlCol="0" anchor="ctr"/>
+            <a:lstStyle/>
+            <a:p>
+              <a:pPr algn="ctr"/>
+              <a:endParaRPr lang="en-GB"/>
+            </a:p>
+          </p:txBody>
+        </p:sp>
+        <p:sp>
+          <p:nvSpPr>
+            <p:cNvPr id="43" name="Freeform 42">
+              <a:extLst>
+                <a:ext uri="{FF2B5EF4-FFF2-40B4-BE49-F238E27FC236}">
+                  <a16:creationId xmlns:a16="http://schemas.microsoft.com/office/drawing/2014/main" id="{84E8DA2D-1D2A-0B46-93B1-9CE6B2AB3717}"/>
+                </a:ext>
+              </a:extLst>
+            </p:cNvPr>
+            <p:cNvSpPr/>
+            <p:nvPr/>
+          </p:nvSpPr>
+          <p:spPr>
+            <a:xfrm rot="10800000">
+              <a:off x="3396082" y="3334573"/>
+              <a:ext cx="397411" cy="240457"/>
+            </a:xfrm>
+            <a:custGeom>
+              <a:avLst/>
+              <a:gdLst>
+                <a:gd name="connsiteX0" fmla="*/ 243405 w 397411"/>
+                <a:gd name="connsiteY0" fmla="*/ 240457 h 240457"/>
+                <a:gd name="connsiteX1" fmla="*/ 382064 w 397411"/>
+                <a:gd name="connsiteY1" fmla="*/ 187992 h 240457"/>
+                <a:gd name="connsiteX2" fmla="*/ 374569 w 397411"/>
+                <a:gd name="connsiteY2" fmla="*/ 79313 h 240457"/>
+                <a:gd name="connsiteX3" fmla="*/ 209678 w 397411"/>
+                <a:gd name="connsiteY3" fmla="*/ 615 h 240457"/>
+                <a:gd name="connsiteX4" fmla="*/ 3563 w 397411"/>
+                <a:gd name="connsiteY4" fmla="*/ 49333 h 240457"/>
+              </a:gdLst>
+              <a:ahLst/>
+              <a:cxnLst>
+                <a:cxn ang="0">
+                  <a:pos x="connsiteX0" y="connsiteY0"/>
+                </a:cxn>
+                <a:cxn ang="0">
+                  <a:pos x="connsiteX1" y="connsiteY1"/>
+                </a:cxn>
+                <a:cxn ang="0">
+                  <a:pos x="connsiteX2" y="connsiteY2"/>
+                </a:cxn>
+                <a:cxn ang="0">
+                  <a:pos x="connsiteX3" y="connsiteY3"/>
+                </a:cxn>
+                <a:cxn ang="0">
+                  <a:pos x="connsiteX4" y="connsiteY4"/>
+                </a:cxn>
+              </a:cxnLst>
+              <a:rect l="l" t="t" r="r" b="b"/>
+              <a:pathLst>
+                <a:path w="397411" h="240457">
+                  <a:moveTo>
+                    <a:pt x="243405" y="240457"/>
+                  </a:moveTo>
+                  <a:cubicBezTo>
+                    <a:pt x="301804" y="227653"/>
+                    <a:pt x="360203" y="214849"/>
+                    <a:pt x="382064" y="187992"/>
+                  </a:cubicBezTo>
+                  <a:cubicBezTo>
+                    <a:pt x="403925" y="161135"/>
+                    <a:pt x="403300" y="110542"/>
+                    <a:pt x="374569" y="79313"/>
+                  </a:cubicBezTo>
+                  <a:cubicBezTo>
+                    <a:pt x="345838" y="48083"/>
+                    <a:pt x="271512" y="5612"/>
+                    <a:pt x="209678" y="615"/>
+                  </a:cubicBezTo>
+                  <a:cubicBezTo>
+                    <a:pt x="147844" y="-4382"/>
+                    <a:pt x="-27042" y="21851"/>
+                    <a:pt x="3563" y="49333"/>
+                  </a:cubicBezTo>
+                </a:path>
+              </a:pathLst>
+            </a:custGeom>
+            <a:noFill/>
+            <a:ln w="25400">
+              <a:solidFill>
+                <a:schemeClr val="accent2"/>
+              </a:solidFill>
+            </a:ln>
+          </p:spPr>
+          <p:style>
+            <a:lnRef idx="2">
+              <a:schemeClr val="accent1">
+                <a:shade val="50000"/>
+              </a:schemeClr>
+            </a:lnRef>
+            <a:fillRef idx="1">
+              <a:schemeClr val="accent1"/>
+            </a:fillRef>
+            <a:effectRef idx="0">
+              <a:schemeClr val="accent1"/>
+            </a:effectRef>
+            <a:fontRef idx="minor">
+              <a:schemeClr val="lt1"/>
+            </a:fontRef>
+          </p:style>
+          <p:txBody>
+            <a:bodyPr rtlCol="0" anchor="ctr"/>
+            <a:lstStyle/>
+            <a:p>
+              <a:pPr algn="ctr"/>
+              <a:endParaRPr lang="en-GB"/>
+            </a:p>
+          </p:txBody>
+        </p:sp>
+      </p:grpSp>
+      <p:grpSp>
+        <p:nvGrpSpPr>
+          <p:cNvPr id="44" name="Group 43">
+            <a:extLst>
+              <a:ext uri="{FF2B5EF4-FFF2-40B4-BE49-F238E27FC236}">
+                <a16:creationId xmlns:a16="http://schemas.microsoft.com/office/drawing/2014/main" id="{4C8B8325-5929-F743-AA22-11C0948DF696}"/>
+              </a:ext>
+            </a:extLst>
+          </p:cNvPr>
+          <p:cNvGrpSpPr/>
+          <p:nvPr/>
+        </p:nvGrpSpPr>
+        <p:grpSpPr>
+          <a:xfrm>
+            <a:off x="1664498" y="1601290"/>
+            <a:ext cx="464432" cy="328689"/>
+            <a:chOff x="3329061" y="3246341"/>
+            <a:chExt cx="464432" cy="328689"/>
+          </a:xfrm>
+        </p:grpSpPr>
+        <p:sp>
+          <p:nvSpPr>
+            <p:cNvPr id="45" name="Oval 44">
+              <a:extLst>
+                <a:ext uri="{FF2B5EF4-FFF2-40B4-BE49-F238E27FC236}">
+                  <a16:creationId xmlns:a16="http://schemas.microsoft.com/office/drawing/2014/main" id="{AF7319C8-CF35-A643-94A6-95E413F66A7F}"/>
+                </a:ext>
+              </a:extLst>
+            </p:cNvPr>
+            <p:cNvSpPr/>
+            <p:nvPr/>
+          </p:nvSpPr>
+          <p:spPr>
+            <a:xfrm>
+              <a:off x="3426966" y="3336447"/>
+              <a:ext cx="248856" cy="150351"/>
+            </a:xfrm>
+            <a:prstGeom prst="ellipse">
+              <a:avLst/>
+            </a:prstGeom>
+            <a:noFill/>
+            <a:ln w="25400">
+              <a:solidFill>
+                <a:schemeClr val="accent2"/>
+              </a:solidFill>
+            </a:ln>
+          </p:spPr>
+          <p:style>
+            <a:lnRef idx="2">
+              <a:schemeClr val="accent1">
+                <a:shade val="50000"/>
+              </a:schemeClr>
+            </a:lnRef>
+            <a:fillRef idx="1">
+              <a:schemeClr val="accent1"/>
+            </a:fillRef>
+            <a:effectRef idx="0">
+              <a:schemeClr val="accent1"/>
+            </a:effectRef>
+            <a:fontRef idx="minor">
+              <a:schemeClr val="lt1"/>
+            </a:fontRef>
+          </p:style>
+          <p:txBody>
+            <a:bodyPr rtlCol="0" anchor="ctr"/>
+            <a:lstStyle/>
+            <a:p>
+              <a:pPr algn="ctr"/>
+              <a:endParaRPr lang="en-GB"/>
+            </a:p>
+          </p:txBody>
+        </p:sp>
+        <p:sp>
+          <p:nvSpPr>
+            <p:cNvPr id="46" name="Freeform 45">
+              <a:extLst>
+                <a:ext uri="{FF2B5EF4-FFF2-40B4-BE49-F238E27FC236}">
+                  <a16:creationId xmlns:a16="http://schemas.microsoft.com/office/drawing/2014/main" id="{D9FA9E4B-9CE0-1642-AAF9-0EA865959E83}"/>
+                </a:ext>
+              </a:extLst>
+            </p:cNvPr>
+            <p:cNvSpPr/>
+            <p:nvPr/>
+          </p:nvSpPr>
+          <p:spPr>
+            <a:xfrm>
+              <a:off x="3329061" y="3246341"/>
+              <a:ext cx="397411" cy="240457"/>
+            </a:xfrm>
+            <a:custGeom>
+              <a:avLst/>
+              <a:gdLst>
+                <a:gd name="connsiteX0" fmla="*/ 243405 w 397411"/>
+                <a:gd name="connsiteY0" fmla="*/ 240457 h 240457"/>
+                <a:gd name="connsiteX1" fmla="*/ 382064 w 397411"/>
+                <a:gd name="connsiteY1" fmla="*/ 187992 h 240457"/>
+                <a:gd name="connsiteX2" fmla="*/ 374569 w 397411"/>
+                <a:gd name="connsiteY2" fmla="*/ 79313 h 240457"/>
+                <a:gd name="connsiteX3" fmla="*/ 209678 w 397411"/>
+                <a:gd name="connsiteY3" fmla="*/ 615 h 240457"/>
+                <a:gd name="connsiteX4" fmla="*/ 3563 w 397411"/>
+                <a:gd name="connsiteY4" fmla="*/ 49333 h 240457"/>
+              </a:gdLst>
+              <a:ahLst/>
+              <a:cxnLst>
+                <a:cxn ang="0">
+                  <a:pos x="connsiteX0" y="connsiteY0"/>
+                </a:cxn>
+                <a:cxn ang="0">
+                  <a:pos x="connsiteX1" y="connsiteY1"/>
+                </a:cxn>
+                <a:cxn ang="0">
+                  <a:pos x="connsiteX2" y="connsiteY2"/>
+                </a:cxn>
+                <a:cxn ang="0">
+                  <a:pos x="connsiteX3" y="connsiteY3"/>
+                </a:cxn>
+                <a:cxn ang="0">
+                  <a:pos x="connsiteX4" y="connsiteY4"/>
+                </a:cxn>
+              </a:cxnLst>
+              <a:rect l="l" t="t" r="r" b="b"/>
+              <a:pathLst>
+                <a:path w="397411" h="240457">
+                  <a:moveTo>
+                    <a:pt x="243405" y="240457"/>
+                  </a:moveTo>
+                  <a:cubicBezTo>
+                    <a:pt x="301804" y="227653"/>
+                    <a:pt x="360203" y="214849"/>
+                    <a:pt x="382064" y="187992"/>
+                  </a:cubicBezTo>
+                  <a:cubicBezTo>
+                    <a:pt x="403925" y="161135"/>
+                    <a:pt x="403300" y="110542"/>
+                    <a:pt x="374569" y="79313"/>
+                  </a:cubicBezTo>
+                  <a:cubicBezTo>
+                    <a:pt x="345838" y="48083"/>
+                    <a:pt x="271512" y="5612"/>
+                    <a:pt x="209678" y="615"/>
+                  </a:cubicBezTo>
+                  <a:cubicBezTo>
+                    <a:pt x="147844" y="-4382"/>
+                    <a:pt x="-27042" y="21851"/>
+                    <a:pt x="3563" y="49333"/>
+                  </a:cubicBezTo>
+                </a:path>
+              </a:pathLst>
+            </a:custGeom>
+            <a:noFill/>
+            <a:ln w="25400">
+              <a:solidFill>
+                <a:schemeClr val="accent2"/>
+              </a:solidFill>
+            </a:ln>
+          </p:spPr>
+          <p:style>
+            <a:lnRef idx="2">
+              <a:schemeClr val="accent1">
+                <a:shade val="50000"/>
+              </a:schemeClr>
+            </a:lnRef>
+            <a:fillRef idx="1">
+              <a:schemeClr val="accent1"/>
+            </a:fillRef>
+            <a:effectRef idx="0">
+              <a:schemeClr val="accent1"/>
+            </a:effectRef>
+            <a:fontRef idx="minor">
+              <a:schemeClr val="lt1"/>
+            </a:fontRef>
+          </p:style>
+          <p:txBody>
+            <a:bodyPr rtlCol="0" anchor="ctr"/>
+            <a:lstStyle/>
+            <a:p>
+              <a:pPr algn="ctr"/>
+              <a:endParaRPr lang="en-GB"/>
+            </a:p>
+          </p:txBody>
+        </p:sp>
+        <p:sp>
+          <p:nvSpPr>
+            <p:cNvPr id="47" name="Freeform 46">
+              <a:extLst>
+                <a:ext uri="{FF2B5EF4-FFF2-40B4-BE49-F238E27FC236}">
+                  <a16:creationId xmlns:a16="http://schemas.microsoft.com/office/drawing/2014/main" id="{61CB81CA-C6AD-8C47-AAFD-A574481F3E30}"/>
+                </a:ext>
+              </a:extLst>
+            </p:cNvPr>
+            <p:cNvSpPr/>
+            <p:nvPr/>
+          </p:nvSpPr>
+          <p:spPr>
+            <a:xfrm rot="10800000">
+              <a:off x="3396082" y="3334573"/>
+              <a:ext cx="397411" cy="240457"/>
+            </a:xfrm>
+            <a:custGeom>
+              <a:avLst/>
+              <a:gdLst>
+                <a:gd name="connsiteX0" fmla="*/ 243405 w 397411"/>
+                <a:gd name="connsiteY0" fmla="*/ 240457 h 240457"/>
+                <a:gd name="connsiteX1" fmla="*/ 382064 w 397411"/>
+                <a:gd name="connsiteY1" fmla="*/ 187992 h 240457"/>
+                <a:gd name="connsiteX2" fmla="*/ 374569 w 397411"/>
+                <a:gd name="connsiteY2" fmla="*/ 79313 h 240457"/>
+                <a:gd name="connsiteX3" fmla="*/ 209678 w 397411"/>
+                <a:gd name="connsiteY3" fmla="*/ 615 h 240457"/>
+                <a:gd name="connsiteX4" fmla="*/ 3563 w 397411"/>
+                <a:gd name="connsiteY4" fmla="*/ 49333 h 240457"/>
+              </a:gdLst>
+              <a:ahLst/>
+              <a:cxnLst>
+                <a:cxn ang="0">
+                  <a:pos x="connsiteX0" y="connsiteY0"/>
+                </a:cxn>
+                <a:cxn ang="0">
+                  <a:pos x="connsiteX1" y="connsiteY1"/>
+                </a:cxn>
+                <a:cxn ang="0">
+                  <a:pos x="connsiteX2" y="connsiteY2"/>
+                </a:cxn>
+                <a:cxn ang="0">
+                  <a:pos x="connsiteX3" y="connsiteY3"/>
+                </a:cxn>
+                <a:cxn ang="0">
+                  <a:pos x="connsiteX4" y="connsiteY4"/>
+                </a:cxn>
+              </a:cxnLst>
+              <a:rect l="l" t="t" r="r" b="b"/>
+              <a:pathLst>
+                <a:path w="397411" h="240457">
+                  <a:moveTo>
+                    <a:pt x="243405" y="240457"/>
+                  </a:moveTo>
+                  <a:cubicBezTo>
+                    <a:pt x="301804" y="227653"/>
+                    <a:pt x="360203" y="214849"/>
+                    <a:pt x="382064" y="187992"/>
+                  </a:cubicBezTo>
+                  <a:cubicBezTo>
+                    <a:pt x="403925" y="161135"/>
+                    <a:pt x="403300" y="110542"/>
+                    <a:pt x="374569" y="79313"/>
+                  </a:cubicBezTo>
+                  <a:cubicBezTo>
+                    <a:pt x="345838" y="48083"/>
+                    <a:pt x="271512" y="5612"/>
+                    <a:pt x="209678" y="615"/>
+                  </a:cubicBezTo>
+                  <a:cubicBezTo>
+                    <a:pt x="147844" y="-4382"/>
+                    <a:pt x="-27042" y="21851"/>
+                    <a:pt x="3563" y="49333"/>
+                  </a:cubicBezTo>
+                </a:path>
+              </a:pathLst>
+            </a:custGeom>
+            <a:noFill/>
+            <a:ln w="25400">
+              <a:solidFill>
+                <a:schemeClr val="accent2"/>
+              </a:solidFill>
+            </a:ln>
+          </p:spPr>
+          <p:style>
+            <a:lnRef idx="2">
+              <a:schemeClr val="accent1">
+                <a:shade val="50000"/>
+              </a:schemeClr>
+            </a:lnRef>
+            <a:fillRef idx="1">
+              <a:schemeClr val="accent1"/>
+            </a:fillRef>
+            <a:effectRef idx="0">
+              <a:schemeClr val="accent1"/>
+            </a:effectRef>
+            <a:fontRef idx="minor">
+              <a:schemeClr val="lt1"/>
+            </a:fontRef>
+          </p:style>
+          <p:txBody>
+            <a:bodyPr rtlCol="0" anchor="ctr"/>
+            <a:lstStyle/>
+            <a:p>
+              <a:pPr algn="ctr"/>
+              <a:endParaRPr lang="en-GB"/>
+            </a:p>
+          </p:txBody>
+        </p:sp>
+      </p:grpSp>
+      <p:grpSp>
+        <p:nvGrpSpPr>
+          <p:cNvPr id="48" name="Group 47">
+            <a:extLst>
+              <a:ext uri="{FF2B5EF4-FFF2-40B4-BE49-F238E27FC236}">
+                <a16:creationId xmlns:a16="http://schemas.microsoft.com/office/drawing/2014/main" id="{224894F9-32E1-1B45-9215-6529BBA5EF51}"/>
+              </a:ext>
+            </a:extLst>
+          </p:cNvPr>
+          <p:cNvGrpSpPr/>
+          <p:nvPr/>
+        </p:nvGrpSpPr>
+        <p:grpSpPr>
+          <a:xfrm>
+            <a:off x="1664498" y="4912349"/>
+            <a:ext cx="464432" cy="328689"/>
+            <a:chOff x="3329061" y="3246341"/>
+            <a:chExt cx="464432" cy="328689"/>
+          </a:xfrm>
+        </p:grpSpPr>
+        <p:sp>
+          <p:nvSpPr>
+            <p:cNvPr id="49" name="Oval 48">
+              <a:extLst>
+                <a:ext uri="{FF2B5EF4-FFF2-40B4-BE49-F238E27FC236}">
+                  <a16:creationId xmlns:a16="http://schemas.microsoft.com/office/drawing/2014/main" id="{E00F1CDB-8FAD-0F46-B9BF-9820802FF8E5}"/>
+                </a:ext>
+              </a:extLst>
+            </p:cNvPr>
+            <p:cNvSpPr/>
+            <p:nvPr/>
+          </p:nvSpPr>
+          <p:spPr>
+            <a:xfrm>
+              <a:off x="3426966" y="3336447"/>
+              <a:ext cx="248856" cy="150351"/>
+            </a:xfrm>
+            <a:prstGeom prst="ellipse">
+              <a:avLst/>
+            </a:prstGeom>
+            <a:noFill/>
+            <a:ln w="25400">
+              <a:solidFill>
+                <a:schemeClr val="accent2"/>
+              </a:solidFill>
+            </a:ln>
+          </p:spPr>
+          <p:style>
+            <a:lnRef idx="2">
+              <a:schemeClr val="accent1">
+                <a:shade val="50000"/>
+              </a:schemeClr>
+            </a:lnRef>
+            <a:fillRef idx="1">
+              <a:schemeClr val="accent1"/>
+            </a:fillRef>
+            <a:effectRef idx="0">
+              <a:schemeClr val="accent1"/>
+            </a:effectRef>
+            <a:fontRef idx="minor">
+              <a:schemeClr val="lt1"/>
+            </a:fontRef>
+          </p:style>
+          <p:txBody>
+            <a:bodyPr rtlCol="0" anchor="ctr"/>
+            <a:lstStyle/>
+            <a:p>
+              <a:pPr algn="ctr"/>
+              <a:endParaRPr lang="en-GB"/>
+            </a:p>
+          </p:txBody>
+        </p:sp>
+        <p:sp>
+          <p:nvSpPr>
+            <p:cNvPr id="50" name="Freeform 49">
+              <a:extLst>
+                <a:ext uri="{FF2B5EF4-FFF2-40B4-BE49-F238E27FC236}">
+                  <a16:creationId xmlns:a16="http://schemas.microsoft.com/office/drawing/2014/main" id="{784535E3-49EC-DF49-B3D6-8FBC8530BF95}"/>
+                </a:ext>
+              </a:extLst>
+            </p:cNvPr>
+            <p:cNvSpPr/>
+            <p:nvPr/>
+          </p:nvSpPr>
+          <p:spPr>
+            <a:xfrm>
+              <a:off x="3329061" y="3246341"/>
+              <a:ext cx="397411" cy="240457"/>
+            </a:xfrm>
+            <a:custGeom>
+              <a:avLst/>
+              <a:gdLst>
+                <a:gd name="connsiteX0" fmla="*/ 243405 w 397411"/>
+                <a:gd name="connsiteY0" fmla="*/ 240457 h 240457"/>
+                <a:gd name="connsiteX1" fmla="*/ 382064 w 397411"/>
+                <a:gd name="connsiteY1" fmla="*/ 187992 h 240457"/>
+                <a:gd name="connsiteX2" fmla="*/ 374569 w 397411"/>
+                <a:gd name="connsiteY2" fmla="*/ 79313 h 240457"/>
+                <a:gd name="connsiteX3" fmla="*/ 209678 w 397411"/>
+                <a:gd name="connsiteY3" fmla="*/ 615 h 240457"/>
+                <a:gd name="connsiteX4" fmla="*/ 3563 w 397411"/>
+                <a:gd name="connsiteY4" fmla="*/ 49333 h 240457"/>
+              </a:gdLst>
+              <a:ahLst/>
+              <a:cxnLst>
+                <a:cxn ang="0">
+                  <a:pos x="connsiteX0" y="connsiteY0"/>
+                </a:cxn>
+                <a:cxn ang="0">
+                  <a:pos x="connsiteX1" y="connsiteY1"/>
+                </a:cxn>
+                <a:cxn ang="0">
+                  <a:pos x="connsiteX2" y="connsiteY2"/>
+                </a:cxn>
+                <a:cxn ang="0">
+                  <a:pos x="connsiteX3" y="connsiteY3"/>
+                </a:cxn>
+                <a:cxn ang="0">
+                  <a:pos x="connsiteX4" y="connsiteY4"/>
+                </a:cxn>
+              </a:cxnLst>
+              <a:rect l="l" t="t" r="r" b="b"/>
+              <a:pathLst>
+                <a:path w="397411" h="240457">
+                  <a:moveTo>
+                    <a:pt x="243405" y="240457"/>
+                  </a:moveTo>
+                  <a:cubicBezTo>
+                    <a:pt x="301804" y="227653"/>
+                    <a:pt x="360203" y="214849"/>
+                    <a:pt x="382064" y="187992"/>
+                  </a:cubicBezTo>
+                  <a:cubicBezTo>
+                    <a:pt x="403925" y="161135"/>
+                    <a:pt x="403300" y="110542"/>
+                    <a:pt x="374569" y="79313"/>
+                  </a:cubicBezTo>
+                  <a:cubicBezTo>
+                    <a:pt x="345838" y="48083"/>
+                    <a:pt x="271512" y="5612"/>
+                    <a:pt x="209678" y="615"/>
+                  </a:cubicBezTo>
+                  <a:cubicBezTo>
+                    <a:pt x="147844" y="-4382"/>
+                    <a:pt x="-27042" y="21851"/>
+                    <a:pt x="3563" y="49333"/>
+                  </a:cubicBezTo>
+                </a:path>
+              </a:pathLst>
+            </a:custGeom>
+            <a:noFill/>
+            <a:ln w="25400">
+              <a:solidFill>
+                <a:schemeClr val="accent2"/>
+              </a:solidFill>
+            </a:ln>
+          </p:spPr>
+          <p:style>
+            <a:lnRef idx="2">
+              <a:schemeClr val="accent1">
+                <a:shade val="50000"/>
+              </a:schemeClr>
+            </a:lnRef>
+            <a:fillRef idx="1">
+              <a:schemeClr val="accent1"/>
+            </a:fillRef>
+            <a:effectRef idx="0">
+              <a:schemeClr val="accent1"/>
+            </a:effectRef>
+            <a:fontRef idx="minor">
+              <a:schemeClr val="lt1"/>
+            </a:fontRef>
+          </p:style>
+          <p:txBody>
+            <a:bodyPr rtlCol="0" anchor="ctr"/>
+            <a:lstStyle/>
+            <a:p>
+              <a:pPr algn="ctr"/>
+              <a:endParaRPr lang="en-GB"/>
+            </a:p>
+          </p:txBody>
+        </p:sp>
+        <p:sp>
+          <p:nvSpPr>
+            <p:cNvPr id="53" name="Freeform 52">
+              <a:extLst>
+                <a:ext uri="{FF2B5EF4-FFF2-40B4-BE49-F238E27FC236}">
+                  <a16:creationId xmlns:a16="http://schemas.microsoft.com/office/drawing/2014/main" id="{2FF70D74-600D-2E4C-B851-C02F270D9FA1}"/>
+                </a:ext>
+              </a:extLst>
+            </p:cNvPr>
+            <p:cNvSpPr/>
+            <p:nvPr/>
+          </p:nvSpPr>
+          <p:spPr>
+            <a:xfrm rot="10800000">
+              <a:off x="3396082" y="3334573"/>
+              <a:ext cx="397411" cy="240457"/>
+            </a:xfrm>
+            <a:custGeom>
+              <a:avLst/>
+              <a:gdLst>
+                <a:gd name="connsiteX0" fmla="*/ 243405 w 397411"/>
+                <a:gd name="connsiteY0" fmla="*/ 240457 h 240457"/>
+                <a:gd name="connsiteX1" fmla="*/ 382064 w 397411"/>
+                <a:gd name="connsiteY1" fmla="*/ 187992 h 240457"/>
+                <a:gd name="connsiteX2" fmla="*/ 374569 w 397411"/>
+                <a:gd name="connsiteY2" fmla="*/ 79313 h 240457"/>
+                <a:gd name="connsiteX3" fmla="*/ 209678 w 397411"/>
+                <a:gd name="connsiteY3" fmla="*/ 615 h 240457"/>
+                <a:gd name="connsiteX4" fmla="*/ 3563 w 397411"/>
+                <a:gd name="connsiteY4" fmla="*/ 49333 h 240457"/>
+              </a:gdLst>
+              <a:ahLst/>
+              <a:cxnLst>
+                <a:cxn ang="0">
+                  <a:pos x="connsiteX0" y="connsiteY0"/>
+                </a:cxn>
+                <a:cxn ang="0">
+                  <a:pos x="connsiteX1" y="connsiteY1"/>
+                </a:cxn>
+                <a:cxn ang="0">
+                  <a:pos x="connsiteX2" y="connsiteY2"/>
+                </a:cxn>
+                <a:cxn ang="0">
+                  <a:pos x="connsiteX3" y="connsiteY3"/>
+                </a:cxn>
+                <a:cxn ang="0">
+                  <a:pos x="connsiteX4" y="connsiteY4"/>
+                </a:cxn>
+              </a:cxnLst>
+              <a:rect l="l" t="t" r="r" b="b"/>
+              <a:pathLst>
+                <a:path w="397411" h="240457">
+                  <a:moveTo>
+                    <a:pt x="243405" y="240457"/>
+                  </a:moveTo>
+                  <a:cubicBezTo>
+                    <a:pt x="301804" y="227653"/>
+                    <a:pt x="360203" y="214849"/>
+                    <a:pt x="382064" y="187992"/>
+                  </a:cubicBezTo>
+                  <a:cubicBezTo>
+                    <a:pt x="403925" y="161135"/>
+                    <a:pt x="403300" y="110542"/>
+                    <a:pt x="374569" y="79313"/>
+                  </a:cubicBezTo>
+                  <a:cubicBezTo>
+                    <a:pt x="345838" y="48083"/>
+                    <a:pt x="271512" y="5612"/>
+                    <a:pt x="209678" y="615"/>
+                  </a:cubicBezTo>
+                  <a:cubicBezTo>
+                    <a:pt x="147844" y="-4382"/>
+                    <a:pt x="-27042" y="21851"/>
+                    <a:pt x="3563" y="49333"/>
+                  </a:cubicBezTo>
+                </a:path>
+              </a:pathLst>
+            </a:custGeom>
+            <a:noFill/>
+            <a:ln w="25400">
+              <a:solidFill>
+                <a:schemeClr val="accent2"/>
+              </a:solidFill>
+            </a:ln>
+          </p:spPr>
+          <p:style>
+            <a:lnRef idx="2">
+              <a:schemeClr val="accent1">
+                <a:shade val="50000"/>
+              </a:schemeClr>
+            </a:lnRef>
+            <a:fillRef idx="1">
+              <a:schemeClr val="accent1"/>
+            </a:fillRef>
+            <a:effectRef idx="0">
+              <a:schemeClr val="accent1"/>
+            </a:effectRef>
+            <a:fontRef idx="minor">
+              <a:schemeClr val="lt1"/>
+            </a:fontRef>
+          </p:style>
+          <p:txBody>
+            <a:bodyPr rtlCol="0" anchor="ctr"/>
+            <a:lstStyle/>
+            <a:p>
+              <a:pPr algn="ctr"/>
+              <a:endParaRPr lang="en-GB"/>
+            </a:p>
+          </p:txBody>
+        </p:sp>
+      </p:grpSp>
+      <p:grpSp>
+        <p:nvGrpSpPr>
+          <p:cNvPr id="54" name="Group 53">
+            <a:extLst>
+              <a:ext uri="{FF2B5EF4-FFF2-40B4-BE49-F238E27FC236}">
+                <a16:creationId xmlns:a16="http://schemas.microsoft.com/office/drawing/2014/main" id="{CFAB3DE9-26C1-1046-B697-EA3C9E394297}"/>
+              </a:ext>
+            </a:extLst>
+          </p:cNvPr>
+          <p:cNvGrpSpPr/>
+          <p:nvPr/>
+        </p:nvGrpSpPr>
+        <p:grpSpPr>
+          <a:xfrm>
+            <a:off x="1651979" y="3247886"/>
+            <a:ext cx="464432" cy="328689"/>
+            <a:chOff x="3329061" y="3246341"/>
+            <a:chExt cx="464432" cy="328689"/>
+          </a:xfrm>
+        </p:grpSpPr>
+        <p:sp>
+          <p:nvSpPr>
+            <p:cNvPr id="55" name="Oval 54">
+              <a:extLst>
+                <a:ext uri="{FF2B5EF4-FFF2-40B4-BE49-F238E27FC236}">
+                  <a16:creationId xmlns:a16="http://schemas.microsoft.com/office/drawing/2014/main" id="{B1CA832C-A23F-6B41-9803-D0270DC75CD2}"/>
+                </a:ext>
+              </a:extLst>
+            </p:cNvPr>
+            <p:cNvSpPr/>
+            <p:nvPr/>
+          </p:nvSpPr>
+          <p:spPr>
+            <a:xfrm>
+              <a:off x="3426966" y="3336447"/>
+              <a:ext cx="248856" cy="150351"/>
+            </a:xfrm>
+            <a:prstGeom prst="ellipse">
+              <a:avLst/>
+            </a:prstGeom>
+            <a:noFill/>
+            <a:ln w="25400">
+              <a:solidFill>
+                <a:schemeClr val="accent2"/>
+              </a:solidFill>
+            </a:ln>
+          </p:spPr>
+          <p:style>
+            <a:lnRef idx="2">
+              <a:schemeClr val="accent1">
+                <a:shade val="50000"/>
+              </a:schemeClr>
+            </a:lnRef>
+            <a:fillRef idx="1">
+              <a:schemeClr val="accent1"/>
+            </a:fillRef>
+            <a:effectRef idx="0">
+              <a:schemeClr val="accent1"/>
+            </a:effectRef>
+            <a:fontRef idx="minor">
+              <a:schemeClr val="lt1"/>
+            </a:fontRef>
+          </p:style>
+          <p:txBody>
+            <a:bodyPr rtlCol="0" anchor="ctr"/>
+            <a:lstStyle/>
+            <a:p>
+              <a:pPr algn="ctr"/>
+              <a:endParaRPr lang="en-GB"/>
+            </a:p>
+          </p:txBody>
+        </p:sp>
+        <p:sp>
+          <p:nvSpPr>
+            <p:cNvPr id="56" name="Freeform 55">
+              <a:extLst>
+                <a:ext uri="{FF2B5EF4-FFF2-40B4-BE49-F238E27FC236}">
+                  <a16:creationId xmlns:a16="http://schemas.microsoft.com/office/drawing/2014/main" id="{5A720FE9-E653-F14C-95F4-200986221CF1}"/>
+                </a:ext>
+              </a:extLst>
+            </p:cNvPr>
+            <p:cNvSpPr/>
+            <p:nvPr/>
+          </p:nvSpPr>
+          <p:spPr>
+            <a:xfrm>
+              <a:off x="3329061" y="3246341"/>
+              <a:ext cx="397411" cy="240457"/>
+            </a:xfrm>
+            <a:custGeom>
+              <a:avLst/>
+              <a:gdLst>
+                <a:gd name="connsiteX0" fmla="*/ 243405 w 397411"/>
+                <a:gd name="connsiteY0" fmla="*/ 240457 h 240457"/>
+                <a:gd name="connsiteX1" fmla="*/ 382064 w 397411"/>
+                <a:gd name="connsiteY1" fmla="*/ 187992 h 240457"/>
+                <a:gd name="connsiteX2" fmla="*/ 374569 w 397411"/>
+                <a:gd name="connsiteY2" fmla="*/ 79313 h 240457"/>
+                <a:gd name="connsiteX3" fmla="*/ 209678 w 397411"/>
+                <a:gd name="connsiteY3" fmla="*/ 615 h 240457"/>
+                <a:gd name="connsiteX4" fmla="*/ 3563 w 397411"/>
+                <a:gd name="connsiteY4" fmla="*/ 49333 h 240457"/>
+              </a:gdLst>
+              <a:ahLst/>
+              <a:cxnLst>
+                <a:cxn ang="0">
+                  <a:pos x="connsiteX0" y="connsiteY0"/>
+                </a:cxn>
+                <a:cxn ang="0">
+                  <a:pos x="connsiteX1" y="connsiteY1"/>
+                </a:cxn>
+                <a:cxn ang="0">
+                  <a:pos x="connsiteX2" y="connsiteY2"/>
+                </a:cxn>
+                <a:cxn ang="0">
+                  <a:pos x="connsiteX3" y="connsiteY3"/>
+                </a:cxn>
+                <a:cxn ang="0">
+                  <a:pos x="connsiteX4" y="connsiteY4"/>
+                </a:cxn>
+              </a:cxnLst>
+              <a:rect l="l" t="t" r="r" b="b"/>
+              <a:pathLst>
+                <a:path w="397411" h="240457">
+                  <a:moveTo>
+                    <a:pt x="243405" y="240457"/>
+                  </a:moveTo>
+                  <a:cubicBezTo>
+                    <a:pt x="301804" y="227653"/>
+                    <a:pt x="360203" y="214849"/>
+                    <a:pt x="382064" y="187992"/>
+                  </a:cubicBezTo>
+                  <a:cubicBezTo>
+                    <a:pt x="403925" y="161135"/>
+                    <a:pt x="403300" y="110542"/>
+                    <a:pt x="374569" y="79313"/>
+                  </a:cubicBezTo>
+                  <a:cubicBezTo>
+                    <a:pt x="345838" y="48083"/>
+                    <a:pt x="271512" y="5612"/>
+                    <a:pt x="209678" y="615"/>
+                  </a:cubicBezTo>
+                  <a:cubicBezTo>
+                    <a:pt x="147844" y="-4382"/>
+                    <a:pt x="-27042" y="21851"/>
+                    <a:pt x="3563" y="49333"/>
+                  </a:cubicBezTo>
+                </a:path>
+              </a:pathLst>
+            </a:custGeom>
+            <a:noFill/>
+            <a:ln w="25400">
+              <a:solidFill>
+                <a:schemeClr val="accent2"/>
+              </a:solidFill>
+            </a:ln>
+          </p:spPr>
+          <p:style>
+            <a:lnRef idx="2">
+              <a:schemeClr val="accent1">
+                <a:shade val="50000"/>
+              </a:schemeClr>
+            </a:lnRef>
+            <a:fillRef idx="1">
+              <a:schemeClr val="accent1"/>
+            </a:fillRef>
+            <a:effectRef idx="0">
+              <a:schemeClr val="accent1"/>
+            </a:effectRef>
+            <a:fontRef idx="minor">
+              <a:schemeClr val="lt1"/>
+            </a:fontRef>
+          </p:style>
+          <p:txBody>
+            <a:bodyPr rtlCol="0" anchor="ctr"/>
+            <a:lstStyle/>
+            <a:p>
+              <a:pPr algn="ctr"/>
+              <a:endParaRPr lang="en-GB"/>
+            </a:p>
+          </p:txBody>
+        </p:sp>
+        <p:sp>
+          <p:nvSpPr>
+            <p:cNvPr id="59" name="Freeform 58">
+              <a:extLst>
+                <a:ext uri="{FF2B5EF4-FFF2-40B4-BE49-F238E27FC236}">
+                  <a16:creationId xmlns:a16="http://schemas.microsoft.com/office/drawing/2014/main" id="{5A43895E-3966-1F48-AA1F-0369178AF6F0}"/>
+                </a:ext>
+              </a:extLst>
+            </p:cNvPr>
+            <p:cNvSpPr/>
+            <p:nvPr/>
+          </p:nvSpPr>
+          <p:spPr>
+            <a:xfrm rot="10800000">
+              <a:off x="3396082" y="3334573"/>
+              <a:ext cx="397411" cy="240457"/>
+            </a:xfrm>
+            <a:custGeom>
+              <a:avLst/>
+              <a:gdLst>
+                <a:gd name="connsiteX0" fmla="*/ 243405 w 397411"/>
+                <a:gd name="connsiteY0" fmla="*/ 240457 h 240457"/>
+                <a:gd name="connsiteX1" fmla="*/ 382064 w 397411"/>
+                <a:gd name="connsiteY1" fmla="*/ 187992 h 240457"/>
+                <a:gd name="connsiteX2" fmla="*/ 374569 w 397411"/>
+                <a:gd name="connsiteY2" fmla="*/ 79313 h 240457"/>
+                <a:gd name="connsiteX3" fmla="*/ 209678 w 397411"/>
+                <a:gd name="connsiteY3" fmla="*/ 615 h 240457"/>
+                <a:gd name="connsiteX4" fmla="*/ 3563 w 397411"/>
+                <a:gd name="connsiteY4" fmla="*/ 49333 h 240457"/>
+              </a:gdLst>
+              <a:ahLst/>
+              <a:cxnLst>
+                <a:cxn ang="0">
+                  <a:pos x="connsiteX0" y="connsiteY0"/>
+                </a:cxn>
+                <a:cxn ang="0">
+                  <a:pos x="connsiteX1" y="connsiteY1"/>
+                </a:cxn>
+                <a:cxn ang="0">
+                  <a:pos x="connsiteX2" y="connsiteY2"/>
+                </a:cxn>
+                <a:cxn ang="0">
+                  <a:pos x="connsiteX3" y="connsiteY3"/>
+                </a:cxn>
+                <a:cxn ang="0">
+                  <a:pos x="connsiteX4" y="connsiteY4"/>
+                </a:cxn>
+              </a:cxnLst>
+              <a:rect l="l" t="t" r="r" b="b"/>
+              <a:pathLst>
+                <a:path w="397411" h="240457">
+                  <a:moveTo>
+                    <a:pt x="243405" y="240457"/>
+                  </a:moveTo>
+                  <a:cubicBezTo>
+                    <a:pt x="301804" y="227653"/>
+                    <a:pt x="360203" y="214849"/>
+                    <a:pt x="382064" y="187992"/>
+                  </a:cubicBezTo>
+                  <a:cubicBezTo>
+                    <a:pt x="403925" y="161135"/>
+                    <a:pt x="403300" y="110542"/>
+                    <a:pt x="374569" y="79313"/>
+                  </a:cubicBezTo>
+                  <a:cubicBezTo>
+                    <a:pt x="345838" y="48083"/>
+                    <a:pt x="271512" y="5612"/>
+                    <a:pt x="209678" y="615"/>
+                  </a:cubicBezTo>
+                  <a:cubicBezTo>
+                    <a:pt x="147844" y="-4382"/>
+                    <a:pt x="-27042" y="21851"/>
+                    <a:pt x="3563" y="49333"/>
+                  </a:cubicBezTo>
+                </a:path>
+              </a:pathLst>
+            </a:custGeom>
+            <a:noFill/>
+            <a:ln w="25400">
+              <a:solidFill>
+                <a:schemeClr val="accent2"/>
+              </a:solidFill>
+            </a:ln>
+          </p:spPr>
+          <p:style>
+            <a:lnRef idx="2">
+              <a:schemeClr val="accent1">
+                <a:shade val="50000"/>
+              </a:schemeClr>
+            </a:lnRef>
+            <a:fillRef idx="1">
+              <a:schemeClr val="accent1"/>
+            </a:fillRef>
+            <a:effectRef idx="0">
+              <a:schemeClr val="accent1"/>
+            </a:effectRef>
+            <a:fontRef idx="minor">
+              <a:schemeClr val="lt1"/>
+            </a:fontRef>
+          </p:style>
+          <p:txBody>
+            <a:bodyPr rtlCol="0" anchor="ctr"/>
+            <a:lstStyle/>
+            <a:p>
+              <a:pPr algn="ctr"/>
+              <a:endParaRPr lang="en-GB"/>
+            </a:p>
+          </p:txBody>
+        </p:sp>
+      </p:grpSp>
     </p:spTree>
     <p:extLst>
       <p:ext uri="{BB962C8B-B14F-4D97-AF65-F5344CB8AC3E}">

</xml_diff>